<commit_message>
Updated Events and WR
</commit_message>
<xml_diff>
--- a/docpac_mar10/WeeklyReview.pptx
+++ b/docpac_mar10/WeeklyReview.pptx
@@ -22,8 +22,10 @@
     <p:sldId id="304" r:id="rId19"/>
     <p:sldId id="305" r:id="rId20"/>
     <p:sldId id="306" r:id="rId21"/>
-    <p:sldId id="307" r:id="rId22"/>
-    <p:sldId id="291" r:id="rId23"/>
+    <p:sldId id="308" r:id="rId22"/>
+    <p:sldId id="309" r:id="rId23"/>
+    <p:sldId id="307" r:id="rId24"/>
+    <p:sldId id="291" r:id="rId25"/>
   </p:sldIdLst>
   <p:sldSz cx="12192000" cy="6858000"/>
   <p:notesSz cx="6858000" cy="9144000"/>
@@ -130,532 +132,156 @@
 </p:presentation>
 </file>
 
-<file path=ppt/revisionInfo.xml><?xml version="1.0" encoding="utf-8"?>
-<p1510:revInfo xmlns:a="http://schemas.openxmlformats.org/drawingml/2006/main" xmlns:r="http://schemas.openxmlformats.org/officeDocument/2006/relationships" xmlns:p1510="http://schemas.microsoft.com/office/powerpoint/2015/10/main">
-  <p1510:revLst>
-    <p1510:client id="{A4BCDF6F-2330-4DAF-BA3A-CC418D4738BE}" v="636" dt="2022-02-27T21:32:17.987"/>
-  </p1510:revLst>
-</p1510:revInfo>
-</file>
-
 <file path=ppt/changesInfos/changesInfo1.xml><?xml version="1.0" encoding="utf-8"?>
 <pc:chgInfo xmlns:a="http://schemas.openxmlformats.org/drawingml/2006/main" xmlns:r="http://schemas.openxmlformats.org/officeDocument/2006/relationships" xmlns:ac="http://schemas.microsoft.com/office/drawing/2013/main/command" xmlns:pc="http://schemas.microsoft.com/office/powerpoint/2013/main/command">
   <pc:docChgLst>
-    <pc:chgData name="SMITH, CHRISTOPHER" userId="dd7fc2d5-9988-40ef-9498-c94fd49fd9a4" providerId="ADAL" clId="{A4BCDF6F-2330-4DAF-BA3A-CC418D4738BE}"/>
-    <pc:docChg chg="undo custSel addSld delSld modSld sldOrd">
-      <pc:chgData name="SMITH, CHRISTOPHER" userId="dd7fc2d5-9988-40ef-9498-c94fd49fd9a4" providerId="ADAL" clId="{A4BCDF6F-2330-4DAF-BA3A-CC418D4738BE}" dt="2022-02-27T21:54:19.381" v="11147" actId="20577"/>
+    <pc:chgData name="Christopher Smith" userId="dd7fc2d5-9988-40ef-9498-c94fd49fd9a4" providerId="ADAL" clId="{F9EAC55B-E4CB-4EC9-93C5-0BCCD297DE25}"/>
+    <pc:docChg chg="custSel modSld">
+      <pc:chgData name="Christopher Smith" userId="dd7fc2d5-9988-40ef-9498-c94fd49fd9a4" providerId="ADAL" clId="{F9EAC55B-E4CB-4EC9-93C5-0BCCD297DE25}" dt="2022-02-07T18:41:39.243" v="592"/>
       <pc:docMkLst>
         <pc:docMk/>
       </pc:docMkLst>
-      <pc:sldChg chg="del">
-        <pc:chgData name="SMITH, CHRISTOPHER" userId="dd7fc2d5-9988-40ef-9498-c94fd49fd9a4" providerId="ADAL" clId="{A4BCDF6F-2330-4DAF-BA3A-CC418D4738BE}" dt="2022-02-27T20:02:03.911" v="4" actId="47"/>
+    </pc:docChg>
+  </pc:docChgLst>
+  <pc:docChgLst>
+    <pc:chgData name="SMITH, CHRISTOPHER" userId="dd7fc2d5-9988-40ef-9498-c94fd49fd9a4" providerId="ADAL" clId="{49376A27-B3E7-488C-B964-DFA53064D0DB}"/>
+    <pc:docChg chg="custSel addSld modSld">
+      <pc:chgData name="SMITH, CHRISTOPHER" userId="dd7fc2d5-9988-40ef-9498-c94fd49fd9a4" providerId="ADAL" clId="{49376A27-B3E7-488C-B964-DFA53064D0DB}" dt="2022-03-07T18:03:41.524" v="128"/>
+      <pc:docMkLst>
+        <pc:docMk/>
+      </pc:docMkLst>
+      <pc:sldChg chg="modAnim">
+        <pc:chgData name="SMITH, CHRISTOPHER" userId="dd7fc2d5-9988-40ef-9498-c94fd49fd9a4" providerId="ADAL" clId="{49376A27-B3E7-488C-B964-DFA53064D0DB}" dt="2022-03-07T18:03:36.310" v="126"/>
         <pc:sldMkLst>
           <pc:docMk/>
-          <pc:sldMk cId="2507572621" sldId="257"/>
+          <pc:sldMk cId="2915901128" sldId="305"/>
         </pc:sldMkLst>
       </pc:sldChg>
-      <pc:sldChg chg="del">
-        <pc:chgData name="SMITH, CHRISTOPHER" userId="dd7fc2d5-9988-40ef-9498-c94fd49fd9a4" providerId="ADAL" clId="{A4BCDF6F-2330-4DAF-BA3A-CC418D4738BE}" dt="2022-02-27T20:04:18.172" v="237" actId="47"/>
+      <pc:sldChg chg="modSp modAnim">
+        <pc:chgData name="SMITH, CHRISTOPHER" userId="dd7fc2d5-9988-40ef-9498-c94fd49fd9a4" providerId="ADAL" clId="{49376A27-B3E7-488C-B964-DFA53064D0DB}" dt="2022-03-07T18:03:38.739" v="127"/>
         <pc:sldMkLst>
           <pc:docMk/>
-          <pc:sldMk cId="1424444010" sldId="258"/>
-        </pc:sldMkLst>
-      </pc:sldChg>
-      <pc:sldChg chg="del">
-        <pc:chgData name="SMITH, CHRISTOPHER" userId="dd7fc2d5-9988-40ef-9498-c94fd49fd9a4" providerId="ADAL" clId="{A4BCDF6F-2330-4DAF-BA3A-CC418D4738BE}" dt="2022-02-27T20:02:03.132" v="3" actId="47"/>
-        <pc:sldMkLst>
-          <pc:docMk/>
-          <pc:sldMk cId="1215748744" sldId="259"/>
-        </pc:sldMkLst>
-      </pc:sldChg>
-      <pc:sldChg chg="del">
-        <pc:chgData name="SMITH, CHRISTOPHER" userId="dd7fc2d5-9988-40ef-9498-c94fd49fd9a4" providerId="ADAL" clId="{A4BCDF6F-2330-4DAF-BA3A-CC418D4738BE}" dt="2022-02-27T20:02:00.665" v="0" actId="47"/>
-        <pc:sldMkLst>
-          <pc:docMk/>
-          <pc:sldMk cId="3057571475" sldId="260"/>
-        </pc:sldMkLst>
-      </pc:sldChg>
-      <pc:sldChg chg="del">
-        <pc:chgData name="SMITH, CHRISTOPHER" userId="dd7fc2d5-9988-40ef-9498-c94fd49fd9a4" providerId="ADAL" clId="{A4BCDF6F-2330-4DAF-BA3A-CC418D4738BE}" dt="2022-02-27T20:02:02.103" v="2" actId="47"/>
-        <pc:sldMkLst>
-          <pc:docMk/>
-          <pc:sldMk cId="1700104824" sldId="261"/>
-        </pc:sldMkLst>
-      </pc:sldChg>
-      <pc:sldChg chg="del">
-        <pc:chgData name="SMITH, CHRISTOPHER" userId="dd7fc2d5-9988-40ef-9498-c94fd49fd9a4" providerId="ADAL" clId="{A4BCDF6F-2330-4DAF-BA3A-CC418D4738BE}" dt="2022-02-27T20:02:01.457" v="1" actId="47"/>
-        <pc:sldMkLst>
-          <pc:docMk/>
-          <pc:sldMk cId="279129629" sldId="262"/>
-        </pc:sldMkLst>
-      </pc:sldChg>
-      <pc:sldChg chg="modSp mod modAnim">
-        <pc:chgData name="SMITH, CHRISTOPHER" userId="dd7fc2d5-9988-40ef-9498-c94fd49fd9a4" providerId="ADAL" clId="{A4BCDF6F-2330-4DAF-BA3A-CC418D4738BE}" dt="2022-02-27T21:24:43.955" v="7218" actId="20577"/>
-        <pc:sldMkLst>
-          <pc:docMk/>
-          <pc:sldMk cId="689825584" sldId="263"/>
+          <pc:sldMk cId="1321469266" sldId="306"/>
         </pc:sldMkLst>
         <pc:spChg chg="mod">
-          <ac:chgData name="SMITH, CHRISTOPHER" userId="dd7fc2d5-9988-40ef-9498-c94fd49fd9a4" providerId="ADAL" clId="{A4BCDF6F-2330-4DAF-BA3A-CC418D4738BE}" dt="2022-02-27T20:03:06.808" v="93" actId="20577"/>
+          <ac:chgData name="SMITH, CHRISTOPHER" userId="dd7fc2d5-9988-40ef-9498-c94fd49fd9a4" providerId="ADAL" clId="{49376A27-B3E7-488C-B964-DFA53064D0DB}" dt="2022-03-07T17:34:55.183" v="52" actId="20577"/>
           <ac:spMkLst>
             <pc:docMk/>
-            <pc:sldMk cId="689825584" sldId="263"/>
-            <ac:spMk id="2" creationId="{B38183FB-ABB9-4B2D-B6EC-26C688D49BD7}"/>
-          </ac:spMkLst>
-        </pc:spChg>
-        <pc:spChg chg="mod">
-          <ac:chgData name="SMITH, CHRISTOPHER" userId="dd7fc2d5-9988-40ef-9498-c94fd49fd9a4" providerId="ADAL" clId="{A4BCDF6F-2330-4DAF-BA3A-CC418D4738BE}" dt="2022-02-27T21:24:43.955" v="7218" actId="20577"/>
-          <ac:spMkLst>
-            <pc:docMk/>
-            <pc:sldMk cId="689825584" sldId="263"/>
-            <ac:spMk id="3" creationId="{C3487442-AAD4-4D34-82C2-90BCA69B3D67}"/>
+            <pc:sldMk cId="1321469266" sldId="306"/>
+            <ac:spMk id="3" creationId="{EA61E9FC-5184-4B34-BC57-79ADFA9BFA3E}"/>
           </ac:spMkLst>
         </pc:spChg>
       </pc:sldChg>
-      <pc:sldChg chg="del">
-        <pc:chgData name="SMITH, CHRISTOPHER" userId="dd7fc2d5-9988-40ef-9498-c94fd49fd9a4" providerId="ADAL" clId="{A4BCDF6F-2330-4DAF-BA3A-CC418D4738BE}" dt="2022-02-27T20:04:15.026" v="236" actId="47"/>
+      <pc:sldChg chg="modAnim">
+        <pc:chgData name="SMITH, CHRISTOPHER" userId="dd7fc2d5-9988-40ef-9498-c94fd49fd9a4" providerId="ADAL" clId="{49376A27-B3E7-488C-B964-DFA53064D0DB}" dt="2022-03-07T18:03:41.524" v="128"/>
         <pc:sldMkLst>
           <pc:docMk/>
-          <pc:sldMk cId="273950689" sldId="264"/>
+          <pc:sldMk cId="2401728319" sldId="307"/>
         </pc:sldMkLst>
       </pc:sldChg>
-      <pc:sldChg chg="modSp new mod ord">
-        <pc:chgData name="SMITH, CHRISTOPHER" userId="dd7fc2d5-9988-40ef-9498-c94fd49fd9a4" providerId="ADAL" clId="{A4BCDF6F-2330-4DAF-BA3A-CC418D4738BE}" dt="2022-02-27T20:25:51.119" v="1176" actId="20577"/>
+      <pc:sldChg chg="addSp delSp modSp add">
+        <pc:chgData name="SMITH, CHRISTOPHER" userId="dd7fc2d5-9988-40ef-9498-c94fd49fd9a4" providerId="ADAL" clId="{49376A27-B3E7-488C-B964-DFA53064D0DB}" dt="2022-03-07T17:45:34.651" v="63"/>
         <pc:sldMkLst>
           <pc:docMk/>
-          <pc:sldMk cId="4169265430" sldId="264"/>
+          <pc:sldMk cId="893090282" sldId="308"/>
         </pc:sldMkLst>
         <pc:spChg chg="mod">
-          <ac:chgData name="SMITH, CHRISTOPHER" userId="dd7fc2d5-9988-40ef-9498-c94fd49fd9a4" providerId="ADAL" clId="{A4BCDF6F-2330-4DAF-BA3A-CC418D4738BE}" dt="2022-02-27T20:19:42.263" v="715" actId="20577"/>
+          <ac:chgData name="SMITH, CHRISTOPHER" userId="dd7fc2d5-9988-40ef-9498-c94fd49fd9a4" providerId="ADAL" clId="{49376A27-B3E7-488C-B964-DFA53064D0DB}" dt="2022-03-07T17:35:01.555" v="62" actId="20577"/>
           <ac:spMkLst>
             <pc:docMk/>
-            <pc:sldMk cId="4169265430" sldId="264"/>
-            <ac:spMk id="2" creationId="{266F4D9C-8850-40AC-AB57-67557E0AB60B}"/>
-          </ac:spMkLst>
-        </pc:spChg>
-        <pc:spChg chg="mod">
-          <ac:chgData name="SMITH, CHRISTOPHER" userId="dd7fc2d5-9988-40ef-9498-c94fd49fd9a4" providerId="ADAL" clId="{A4BCDF6F-2330-4DAF-BA3A-CC418D4738BE}" dt="2022-02-27T20:25:51.119" v="1176" actId="20577"/>
-          <ac:spMkLst>
-            <pc:docMk/>
-            <pc:sldMk cId="4169265430" sldId="264"/>
-            <ac:spMk id="3" creationId="{CAB66B1E-DCF9-43D3-90A2-5FF2C28509D7}"/>
-          </ac:spMkLst>
-        </pc:spChg>
-      </pc:sldChg>
-      <pc:sldChg chg="modSp new mod">
-        <pc:chgData name="SMITH, CHRISTOPHER" userId="dd7fc2d5-9988-40ef-9498-c94fd49fd9a4" providerId="ADAL" clId="{A4BCDF6F-2330-4DAF-BA3A-CC418D4738BE}" dt="2022-02-27T20:32:55.841" v="1737" actId="20577"/>
-        <pc:sldMkLst>
-          <pc:docMk/>
-          <pc:sldMk cId="90982063" sldId="265"/>
-        </pc:sldMkLst>
-        <pc:spChg chg="mod">
-          <ac:chgData name="SMITH, CHRISTOPHER" userId="dd7fc2d5-9988-40ef-9498-c94fd49fd9a4" providerId="ADAL" clId="{A4BCDF6F-2330-4DAF-BA3A-CC418D4738BE}" dt="2022-02-27T20:25:23.728" v="1101" actId="20577"/>
-          <ac:spMkLst>
-            <pc:docMk/>
-            <pc:sldMk cId="90982063" sldId="265"/>
-            <ac:spMk id="2" creationId="{1D9CA010-E70C-477C-8D98-1A0C0F30159E}"/>
-          </ac:spMkLst>
-        </pc:spChg>
-        <pc:spChg chg="mod">
-          <ac:chgData name="SMITH, CHRISTOPHER" userId="dd7fc2d5-9988-40ef-9498-c94fd49fd9a4" providerId="ADAL" clId="{A4BCDF6F-2330-4DAF-BA3A-CC418D4738BE}" dt="2022-02-27T20:32:55.841" v="1737" actId="20577"/>
-          <ac:spMkLst>
-            <pc:docMk/>
-            <pc:sldMk cId="90982063" sldId="265"/>
-            <ac:spMk id="3" creationId="{913916F7-C979-42D1-BDFD-4E7C10EB886B}"/>
-          </ac:spMkLst>
-        </pc:spChg>
-      </pc:sldChg>
-      <pc:sldChg chg="modSp new mod">
-        <pc:chgData name="SMITH, CHRISTOPHER" userId="dd7fc2d5-9988-40ef-9498-c94fd49fd9a4" providerId="ADAL" clId="{A4BCDF6F-2330-4DAF-BA3A-CC418D4738BE}" dt="2022-02-27T20:42:39.409" v="2683" actId="20577"/>
-        <pc:sldMkLst>
-          <pc:docMk/>
-          <pc:sldMk cId="1724910602" sldId="266"/>
-        </pc:sldMkLst>
-        <pc:spChg chg="mod">
-          <ac:chgData name="SMITH, CHRISTOPHER" userId="dd7fc2d5-9988-40ef-9498-c94fd49fd9a4" providerId="ADAL" clId="{A4BCDF6F-2330-4DAF-BA3A-CC418D4738BE}" dt="2022-02-27T20:33:24.905" v="1747" actId="20577"/>
-          <ac:spMkLst>
-            <pc:docMk/>
-            <pc:sldMk cId="1724910602" sldId="266"/>
-            <ac:spMk id="2" creationId="{3BB23DDD-D24B-4A82-9CBD-CA7A8F83223E}"/>
-          </ac:spMkLst>
-        </pc:spChg>
-        <pc:spChg chg="mod">
-          <ac:chgData name="SMITH, CHRISTOPHER" userId="dd7fc2d5-9988-40ef-9498-c94fd49fd9a4" providerId="ADAL" clId="{A4BCDF6F-2330-4DAF-BA3A-CC418D4738BE}" dt="2022-02-27T20:42:39.409" v="2683" actId="20577"/>
-          <ac:spMkLst>
-            <pc:docMk/>
-            <pc:sldMk cId="1724910602" sldId="266"/>
-            <ac:spMk id="3" creationId="{2D47D968-CA13-4BE6-BF03-39662B020F70}"/>
-          </ac:spMkLst>
-        </pc:spChg>
-      </pc:sldChg>
-      <pc:sldChg chg="modSp new mod ord">
-        <pc:chgData name="SMITH, CHRISTOPHER" userId="dd7fc2d5-9988-40ef-9498-c94fd49fd9a4" providerId="ADAL" clId="{A4BCDF6F-2330-4DAF-BA3A-CC418D4738BE}" dt="2022-02-27T21:36:26.869" v="8730" actId="20577"/>
-        <pc:sldMkLst>
-          <pc:docMk/>
-          <pc:sldMk cId="2696630280" sldId="267"/>
-        </pc:sldMkLst>
-        <pc:spChg chg="mod">
-          <ac:chgData name="SMITH, CHRISTOPHER" userId="dd7fc2d5-9988-40ef-9498-c94fd49fd9a4" providerId="ADAL" clId="{A4BCDF6F-2330-4DAF-BA3A-CC418D4738BE}" dt="2022-02-27T20:42:49.851" v="2694" actId="20577"/>
-          <ac:spMkLst>
-            <pc:docMk/>
-            <pc:sldMk cId="2696630280" sldId="267"/>
-            <ac:spMk id="2" creationId="{186CDB15-FFB5-4157-8D03-A46C6EBCBFF2}"/>
-          </ac:spMkLst>
-        </pc:spChg>
-        <pc:spChg chg="mod">
-          <ac:chgData name="SMITH, CHRISTOPHER" userId="dd7fc2d5-9988-40ef-9498-c94fd49fd9a4" providerId="ADAL" clId="{A4BCDF6F-2330-4DAF-BA3A-CC418D4738BE}" dt="2022-02-27T21:36:26.869" v="8730" actId="20577"/>
-          <ac:spMkLst>
-            <pc:docMk/>
-            <pc:sldMk cId="2696630280" sldId="267"/>
-            <ac:spMk id="3" creationId="{1969447E-5719-4944-998E-AC272FBC3AE6}"/>
-          </ac:spMkLst>
-        </pc:spChg>
-      </pc:sldChg>
-      <pc:sldChg chg="modSp new mod">
-        <pc:chgData name="SMITH, CHRISTOPHER" userId="dd7fc2d5-9988-40ef-9498-c94fd49fd9a4" providerId="ADAL" clId="{A4BCDF6F-2330-4DAF-BA3A-CC418D4738BE}" dt="2022-02-27T20:53:29.064" v="3895" actId="20577"/>
-        <pc:sldMkLst>
-          <pc:docMk/>
-          <pc:sldMk cId="1386715285" sldId="268"/>
-        </pc:sldMkLst>
-        <pc:spChg chg="mod">
-          <ac:chgData name="SMITH, CHRISTOPHER" userId="dd7fc2d5-9988-40ef-9498-c94fd49fd9a4" providerId="ADAL" clId="{A4BCDF6F-2330-4DAF-BA3A-CC418D4738BE}" dt="2022-02-27T20:43:33.864" v="2732" actId="20577"/>
-          <ac:spMkLst>
-            <pc:docMk/>
-            <pc:sldMk cId="1386715285" sldId="268"/>
-            <ac:spMk id="2" creationId="{DAF0F5DC-D093-4F69-B973-D4ABBEF98B91}"/>
-          </ac:spMkLst>
-        </pc:spChg>
-        <pc:spChg chg="mod">
-          <ac:chgData name="SMITH, CHRISTOPHER" userId="dd7fc2d5-9988-40ef-9498-c94fd49fd9a4" providerId="ADAL" clId="{A4BCDF6F-2330-4DAF-BA3A-CC418D4738BE}" dt="2022-02-27T20:53:29.064" v="3895" actId="20577"/>
-          <ac:spMkLst>
-            <pc:docMk/>
-            <pc:sldMk cId="1386715285" sldId="268"/>
-            <ac:spMk id="3" creationId="{A658A4B0-338E-4B9F-B61F-3AF716FAB7DC}"/>
-          </ac:spMkLst>
-        </pc:spChg>
-      </pc:sldChg>
-      <pc:sldChg chg="modSp new mod">
-        <pc:chgData name="SMITH, CHRISTOPHER" userId="dd7fc2d5-9988-40ef-9498-c94fd49fd9a4" providerId="ADAL" clId="{A4BCDF6F-2330-4DAF-BA3A-CC418D4738BE}" dt="2022-02-27T21:01:39.696" v="4841" actId="20577"/>
-        <pc:sldMkLst>
-          <pc:docMk/>
-          <pc:sldMk cId="1250056142" sldId="269"/>
-        </pc:sldMkLst>
-        <pc:spChg chg="mod">
-          <ac:chgData name="SMITH, CHRISTOPHER" userId="dd7fc2d5-9988-40ef-9498-c94fd49fd9a4" providerId="ADAL" clId="{A4BCDF6F-2330-4DAF-BA3A-CC418D4738BE}" dt="2022-02-27T20:58:49.787" v="4473" actId="20577"/>
-          <ac:spMkLst>
-            <pc:docMk/>
-            <pc:sldMk cId="1250056142" sldId="269"/>
-            <ac:spMk id="2" creationId="{D6ED370F-995D-4B9B-AD85-D5C7AAAB97B2}"/>
-          </ac:spMkLst>
-        </pc:spChg>
-        <pc:spChg chg="mod">
-          <ac:chgData name="SMITH, CHRISTOPHER" userId="dd7fc2d5-9988-40ef-9498-c94fd49fd9a4" providerId="ADAL" clId="{A4BCDF6F-2330-4DAF-BA3A-CC418D4738BE}" dt="2022-02-27T21:01:39.696" v="4841" actId="20577"/>
-          <ac:spMkLst>
-            <pc:docMk/>
-            <pc:sldMk cId="1250056142" sldId="269"/>
-            <ac:spMk id="3" creationId="{4B4B9775-2698-4488-824D-5C224DB5D88B}"/>
-          </ac:spMkLst>
-        </pc:spChg>
-      </pc:sldChg>
-      <pc:sldChg chg="modSp new mod">
-        <pc:chgData name="SMITH, CHRISTOPHER" userId="dd7fc2d5-9988-40ef-9498-c94fd49fd9a4" providerId="ADAL" clId="{A4BCDF6F-2330-4DAF-BA3A-CC418D4738BE}" dt="2022-02-27T21:07:06.167" v="5696" actId="20577"/>
-        <pc:sldMkLst>
-          <pc:docMk/>
-          <pc:sldMk cId="654843008" sldId="270"/>
-        </pc:sldMkLst>
-        <pc:spChg chg="mod">
-          <ac:chgData name="SMITH, CHRISTOPHER" userId="dd7fc2d5-9988-40ef-9498-c94fd49fd9a4" providerId="ADAL" clId="{A4BCDF6F-2330-4DAF-BA3A-CC418D4738BE}" dt="2022-02-27T21:02:44.705" v="4882" actId="20577"/>
-          <ac:spMkLst>
-            <pc:docMk/>
-            <pc:sldMk cId="654843008" sldId="270"/>
-            <ac:spMk id="2" creationId="{D53A7FC3-BBDA-4FBA-B229-9EF7DEAFC462}"/>
-          </ac:spMkLst>
-        </pc:spChg>
-        <pc:spChg chg="mod">
-          <ac:chgData name="SMITH, CHRISTOPHER" userId="dd7fc2d5-9988-40ef-9498-c94fd49fd9a4" providerId="ADAL" clId="{A4BCDF6F-2330-4DAF-BA3A-CC418D4738BE}" dt="2022-02-27T21:07:06.167" v="5696" actId="20577"/>
-          <ac:spMkLst>
-            <pc:docMk/>
-            <pc:sldMk cId="654843008" sldId="270"/>
-            <ac:spMk id="3" creationId="{6BC7C4EE-A133-42D9-B7E6-9B6328B96DD5}"/>
-          </ac:spMkLst>
-        </pc:spChg>
-      </pc:sldChg>
-      <pc:sldChg chg="addSp delSp modSp new mod">
-        <pc:chgData name="SMITH, CHRISTOPHER" userId="dd7fc2d5-9988-40ef-9498-c94fd49fd9a4" providerId="ADAL" clId="{A4BCDF6F-2330-4DAF-BA3A-CC418D4738BE}" dt="2022-02-27T21:10:20.148" v="5730" actId="1076"/>
-        <pc:sldMkLst>
-          <pc:docMk/>
-          <pc:sldMk cId="4072604284" sldId="271"/>
-        </pc:sldMkLst>
-        <pc:spChg chg="del mod">
-          <ac:chgData name="SMITH, CHRISTOPHER" userId="dd7fc2d5-9988-40ef-9498-c94fd49fd9a4" providerId="ADAL" clId="{A4BCDF6F-2330-4DAF-BA3A-CC418D4738BE}" dt="2022-02-27T21:09:35.680" v="5720" actId="478"/>
-          <ac:spMkLst>
-            <pc:docMk/>
-            <pc:sldMk cId="4072604284" sldId="271"/>
-            <ac:spMk id="2" creationId="{DFA92A5E-596F-4103-ACD9-7316B34638C2}"/>
+            <pc:sldMk cId="893090282" sldId="308"/>
+            <ac:spMk id="2" creationId="{38261810-B9E8-4819-B46D-387132E471DC}"/>
           </ac:spMkLst>
         </pc:spChg>
         <pc:spChg chg="del">
-          <ac:chgData name="SMITH, CHRISTOPHER" userId="dd7fc2d5-9988-40ef-9498-c94fd49fd9a4" providerId="ADAL" clId="{A4BCDF6F-2330-4DAF-BA3A-CC418D4738BE}" dt="2022-02-27T21:09:13.205" v="5715"/>
+          <ac:chgData name="SMITH, CHRISTOPHER" userId="dd7fc2d5-9988-40ef-9498-c94fd49fd9a4" providerId="ADAL" clId="{49376A27-B3E7-488C-B964-DFA53064D0DB}" dt="2022-03-07T17:45:34.651" v="63"/>
           <ac:spMkLst>
             <pc:docMk/>
-            <pc:sldMk cId="4072604284" sldId="271"/>
-            <ac:spMk id="3" creationId="{3BDF70E5-534D-45A2-A471-AA7F9EFD576A}"/>
+            <pc:sldMk cId="893090282" sldId="308"/>
+            <ac:spMk id="3" creationId="{0A779DA0-8761-42DB-B2BB-32ED1B4B05DF}"/>
+          </ac:spMkLst>
+        </pc:spChg>
+        <pc:picChg chg="add">
+          <ac:chgData name="SMITH, CHRISTOPHER" userId="dd7fc2d5-9988-40ef-9498-c94fd49fd9a4" providerId="ADAL" clId="{49376A27-B3E7-488C-B964-DFA53064D0DB}" dt="2022-03-07T17:45:34.651" v="63"/>
+          <ac:picMkLst>
+            <pc:docMk/>
+            <pc:sldMk cId="893090282" sldId="308"/>
+            <ac:picMk id="1026" creationId="{974A7584-8B53-4BBE-8248-53CB7CAECD25}"/>
+          </ac:picMkLst>
+        </pc:picChg>
+      </pc:sldChg>
+      <pc:sldChg chg="addSp delSp modSp add">
+        <pc:chgData name="SMITH, CHRISTOPHER" userId="dd7fc2d5-9988-40ef-9498-c94fd49fd9a4" providerId="ADAL" clId="{49376A27-B3E7-488C-B964-DFA53064D0DB}" dt="2022-03-07T18:02:58.105" v="125" actId="20577"/>
+        <pc:sldMkLst>
+          <pc:docMk/>
+          <pc:sldMk cId="3089692019" sldId="309"/>
+        </pc:sldMkLst>
+        <pc:spChg chg="del mod">
+          <ac:chgData name="SMITH, CHRISTOPHER" userId="dd7fc2d5-9988-40ef-9498-c94fd49fd9a4" providerId="ADAL" clId="{49376A27-B3E7-488C-B964-DFA53064D0DB}" dt="2022-03-07T18:01:22.177" v="100" actId="478"/>
+          <ac:spMkLst>
+            <pc:docMk/>
+            <pc:sldMk cId="3089692019" sldId="309"/>
+            <ac:spMk id="2" creationId="{1451911A-9508-4877-AF67-32085A5F5856}"/>
+          </ac:spMkLst>
+        </pc:spChg>
+        <pc:spChg chg="del">
+          <ac:chgData name="SMITH, CHRISTOPHER" userId="dd7fc2d5-9988-40ef-9498-c94fd49fd9a4" providerId="ADAL" clId="{49376A27-B3E7-488C-B964-DFA53064D0DB}" dt="2022-03-07T18:01:13.997" v="99"/>
+          <ac:spMkLst>
+            <pc:docMk/>
+            <pc:sldMk cId="3089692019" sldId="309"/>
+            <ac:spMk id="3" creationId="{66A3E959-F6E0-4661-8916-B188FBA58A99}"/>
           </ac:spMkLst>
         </pc:spChg>
         <pc:spChg chg="add del mod">
-          <ac:chgData name="SMITH, CHRISTOPHER" userId="dd7fc2d5-9988-40ef-9498-c94fd49fd9a4" providerId="ADAL" clId="{A4BCDF6F-2330-4DAF-BA3A-CC418D4738BE}" dt="2022-02-27T21:09:40.474" v="5721" actId="21"/>
+          <ac:chgData name="SMITH, CHRISTOPHER" userId="dd7fc2d5-9988-40ef-9498-c94fd49fd9a4" providerId="ADAL" clId="{49376A27-B3E7-488C-B964-DFA53064D0DB}" dt="2022-03-07T18:01:24.207" v="101" actId="478"/>
           <ac:spMkLst>
             <pc:docMk/>
-            <pc:sldMk cId="4072604284" sldId="271"/>
-            <ac:spMk id="7" creationId="{98576BF4-6C56-4987-8EC6-55416C508A0A}"/>
+            <pc:sldMk cId="3089692019" sldId="309"/>
+            <ac:spMk id="6" creationId="{D16112B1-ACF4-41DD-A06D-22B1EBE10858}"/>
+          </ac:spMkLst>
+        </pc:spChg>
+        <pc:spChg chg="add mod">
+          <ac:chgData name="SMITH, CHRISTOPHER" userId="dd7fc2d5-9988-40ef-9498-c94fd49fd9a4" providerId="ADAL" clId="{49376A27-B3E7-488C-B964-DFA53064D0DB}" dt="2022-03-07T18:02:33.609" v="107" actId="20577"/>
+          <ac:spMkLst>
+            <pc:docMk/>
+            <pc:sldMk cId="3089692019" sldId="309"/>
+            <ac:spMk id="7" creationId="{EDBDED34-C23A-43DA-8779-6BC2DE3C3663}"/>
+          </ac:spMkLst>
+        </pc:spChg>
+        <pc:spChg chg="add mod">
+          <ac:chgData name="SMITH, CHRISTOPHER" userId="dd7fc2d5-9988-40ef-9498-c94fd49fd9a4" providerId="ADAL" clId="{49376A27-B3E7-488C-B964-DFA53064D0DB}" dt="2022-03-07T18:02:47.586" v="120" actId="20577"/>
+          <ac:spMkLst>
+            <pc:docMk/>
+            <pc:sldMk cId="3089692019" sldId="309"/>
+            <ac:spMk id="8" creationId="{BA1BAD06-60DE-4203-9C2B-FEECFFA4AFE7}"/>
+          </ac:spMkLst>
+        </pc:spChg>
+        <pc:spChg chg="add mod">
+          <ac:chgData name="SMITH, CHRISTOPHER" userId="dd7fc2d5-9988-40ef-9498-c94fd49fd9a4" providerId="ADAL" clId="{49376A27-B3E7-488C-B964-DFA53064D0DB}" dt="2022-03-07T18:02:58.105" v="125" actId="20577"/>
+          <ac:spMkLst>
+            <pc:docMk/>
+            <pc:sldMk cId="3089692019" sldId="309"/>
+            <ac:spMk id="9" creationId="{A72D22AD-ABD8-4D5B-B5E3-3BF83CEEFD51}"/>
           </ac:spMkLst>
         </pc:spChg>
         <pc:picChg chg="add mod">
-          <ac:chgData name="SMITH, CHRISTOPHER" userId="dd7fc2d5-9988-40ef-9498-c94fd49fd9a4" providerId="ADAL" clId="{A4BCDF6F-2330-4DAF-BA3A-CC418D4738BE}" dt="2022-02-27T21:10:20.148" v="5730" actId="1076"/>
+          <ac:chgData name="SMITH, CHRISTOPHER" userId="dd7fc2d5-9988-40ef-9498-c94fd49fd9a4" providerId="ADAL" clId="{49376A27-B3E7-488C-B964-DFA53064D0DB}" dt="2022-03-07T18:01:36.525" v="104" actId="1076"/>
           <ac:picMkLst>
             <pc:docMk/>
-            <pc:sldMk cId="4072604284" sldId="271"/>
-            <ac:picMk id="5" creationId="{9A5F6BDD-ADC0-4FBC-A3D5-114E76963430}"/>
+            <pc:sldMk cId="3089692019" sldId="309"/>
+            <ac:picMk id="4" creationId="{446FE656-884D-4938-BA7D-92591F347762}"/>
           </ac:picMkLst>
         </pc:picChg>
       </pc:sldChg>
-      <pc:sldChg chg="modSp new mod">
-        <pc:chgData name="SMITH, CHRISTOPHER" userId="dd7fc2d5-9988-40ef-9498-c94fd49fd9a4" providerId="ADAL" clId="{A4BCDF6F-2330-4DAF-BA3A-CC418D4738BE}" dt="2022-02-27T21:16:05.652" v="6400" actId="20577"/>
-        <pc:sldMkLst>
-          <pc:docMk/>
-          <pc:sldMk cId="3484125150" sldId="272"/>
-        </pc:sldMkLst>
-        <pc:spChg chg="mod">
-          <ac:chgData name="SMITH, CHRISTOPHER" userId="dd7fc2d5-9988-40ef-9498-c94fd49fd9a4" providerId="ADAL" clId="{A4BCDF6F-2330-4DAF-BA3A-CC418D4738BE}" dt="2022-02-27T21:10:28.473" v="5756" actId="20577"/>
-          <ac:spMkLst>
-            <pc:docMk/>
-            <pc:sldMk cId="3484125150" sldId="272"/>
-            <ac:spMk id="2" creationId="{0ED81A38-07DA-4AFB-AAB4-56E66B4367CD}"/>
-          </ac:spMkLst>
-        </pc:spChg>
-        <pc:spChg chg="mod">
-          <ac:chgData name="SMITH, CHRISTOPHER" userId="dd7fc2d5-9988-40ef-9498-c94fd49fd9a4" providerId="ADAL" clId="{A4BCDF6F-2330-4DAF-BA3A-CC418D4738BE}" dt="2022-02-27T21:16:05.652" v="6400" actId="20577"/>
-          <ac:spMkLst>
-            <pc:docMk/>
-            <pc:sldMk cId="3484125150" sldId="272"/>
-            <ac:spMk id="3" creationId="{DCE5CEFC-20FF-4C92-A6C2-9E664DDE49CC}"/>
-          </ac:spMkLst>
-        </pc:spChg>
-      </pc:sldChg>
-      <pc:sldChg chg="add">
-        <pc:chgData name="SMITH, CHRISTOPHER" userId="dd7fc2d5-9988-40ef-9498-c94fd49fd9a4" providerId="ADAL" clId="{A4BCDF6F-2330-4DAF-BA3A-CC418D4738BE}" dt="2022-02-27T21:16:23.020" v="6401"/>
-        <pc:sldMkLst>
-          <pc:docMk/>
-          <pc:sldMk cId="1584929109" sldId="273"/>
-        </pc:sldMkLst>
-      </pc:sldChg>
-      <pc:sldChg chg="modSp new mod">
-        <pc:chgData name="SMITH, CHRISTOPHER" userId="dd7fc2d5-9988-40ef-9498-c94fd49fd9a4" providerId="ADAL" clId="{A4BCDF6F-2330-4DAF-BA3A-CC418D4738BE}" dt="2022-02-27T21:24:04.198" v="7164" actId="20577"/>
-        <pc:sldMkLst>
-          <pc:docMk/>
-          <pc:sldMk cId="2543056126" sldId="274"/>
-        </pc:sldMkLst>
-        <pc:spChg chg="mod">
-          <ac:chgData name="SMITH, CHRISTOPHER" userId="dd7fc2d5-9988-40ef-9498-c94fd49fd9a4" providerId="ADAL" clId="{A4BCDF6F-2330-4DAF-BA3A-CC418D4738BE}" dt="2022-02-27T21:16:56.888" v="6413" actId="20577"/>
-          <ac:spMkLst>
-            <pc:docMk/>
-            <pc:sldMk cId="2543056126" sldId="274"/>
-            <ac:spMk id="2" creationId="{07DCE2E7-8A97-4D85-81AA-FCDBC3DF1BA8}"/>
-          </ac:spMkLst>
-        </pc:spChg>
-        <pc:spChg chg="mod">
-          <ac:chgData name="SMITH, CHRISTOPHER" userId="dd7fc2d5-9988-40ef-9498-c94fd49fd9a4" providerId="ADAL" clId="{A4BCDF6F-2330-4DAF-BA3A-CC418D4738BE}" dt="2022-02-27T21:24:04.198" v="7164" actId="20577"/>
-          <ac:spMkLst>
-            <pc:docMk/>
-            <pc:sldMk cId="2543056126" sldId="274"/>
-            <ac:spMk id="3" creationId="{5689277A-B52C-46D3-88AF-3A3DAFA1BE1A}"/>
-          </ac:spMkLst>
-        </pc:spChg>
-      </pc:sldChg>
-      <pc:sldChg chg="modSp new mod">
-        <pc:chgData name="SMITH, CHRISTOPHER" userId="dd7fc2d5-9988-40ef-9498-c94fd49fd9a4" providerId="ADAL" clId="{A4BCDF6F-2330-4DAF-BA3A-CC418D4738BE}" dt="2022-02-27T21:33:28.593" v="8167" actId="27636"/>
-        <pc:sldMkLst>
-          <pc:docMk/>
-          <pc:sldMk cId="3751383985" sldId="275"/>
-        </pc:sldMkLst>
-        <pc:spChg chg="mod">
-          <ac:chgData name="SMITH, CHRISTOPHER" userId="dd7fc2d5-9988-40ef-9498-c94fd49fd9a4" providerId="ADAL" clId="{A4BCDF6F-2330-4DAF-BA3A-CC418D4738BE}" dt="2022-02-27T21:24:13.739" v="7196" actId="20577"/>
-          <ac:spMkLst>
-            <pc:docMk/>
-            <pc:sldMk cId="3751383985" sldId="275"/>
-            <ac:spMk id="2" creationId="{AA5526DD-0236-46CE-B070-B7B559E1A0BD}"/>
-          </ac:spMkLst>
-        </pc:spChg>
-        <pc:spChg chg="mod">
-          <ac:chgData name="SMITH, CHRISTOPHER" userId="dd7fc2d5-9988-40ef-9498-c94fd49fd9a4" providerId="ADAL" clId="{A4BCDF6F-2330-4DAF-BA3A-CC418D4738BE}" dt="2022-02-27T21:33:28.593" v="8167" actId="27636"/>
-          <ac:spMkLst>
-            <pc:docMk/>
-            <pc:sldMk cId="3751383985" sldId="275"/>
-            <ac:spMk id="3" creationId="{D5F75EEA-641F-4050-8F40-8AD584542E15}"/>
-          </ac:spMkLst>
-        </pc:spChg>
-      </pc:sldChg>
-      <pc:sldChg chg="addSp delSp modSp new mod ord modClrScheme chgLayout">
-        <pc:chgData name="SMITH, CHRISTOPHER" userId="dd7fc2d5-9988-40ef-9498-c94fd49fd9a4" providerId="ADAL" clId="{A4BCDF6F-2330-4DAF-BA3A-CC418D4738BE}" dt="2022-02-27T21:30:27.471" v="7932" actId="20577"/>
-        <pc:sldMkLst>
-          <pc:docMk/>
-          <pc:sldMk cId="2115741306" sldId="276"/>
-        </pc:sldMkLst>
-        <pc:spChg chg="del mod ord">
-          <ac:chgData name="SMITH, CHRISTOPHER" userId="dd7fc2d5-9988-40ef-9498-c94fd49fd9a4" providerId="ADAL" clId="{A4BCDF6F-2330-4DAF-BA3A-CC418D4738BE}" dt="2022-02-27T21:30:24.257" v="7926" actId="700"/>
-          <ac:spMkLst>
-            <pc:docMk/>
-            <pc:sldMk cId="2115741306" sldId="276"/>
-            <ac:spMk id="2" creationId="{01C95FA9-7F35-4AF9-8149-18B966166C85}"/>
-          </ac:spMkLst>
-        </pc:spChg>
-        <pc:spChg chg="del mod ord">
-          <ac:chgData name="SMITH, CHRISTOPHER" userId="dd7fc2d5-9988-40ef-9498-c94fd49fd9a4" providerId="ADAL" clId="{A4BCDF6F-2330-4DAF-BA3A-CC418D4738BE}" dt="2022-02-27T21:30:24.257" v="7926" actId="700"/>
-          <ac:spMkLst>
-            <pc:docMk/>
-            <pc:sldMk cId="2115741306" sldId="276"/>
-            <ac:spMk id="3" creationId="{BDCF2D4E-A2BA-43D4-BA25-CF0CC15EA2F5}"/>
-          </ac:spMkLst>
-        </pc:spChg>
-        <pc:spChg chg="add mod ord">
-          <ac:chgData name="SMITH, CHRISTOPHER" userId="dd7fc2d5-9988-40ef-9498-c94fd49fd9a4" providerId="ADAL" clId="{A4BCDF6F-2330-4DAF-BA3A-CC418D4738BE}" dt="2022-02-27T21:30:27.471" v="7932" actId="20577"/>
-          <ac:spMkLst>
-            <pc:docMk/>
-            <pc:sldMk cId="2115741306" sldId="276"/>
-            <ac:spMk id="4" creationId="{814BFB6E-7834-4E90-8F3E-E54FD1EEB3E1}"/>
-          </ac:spMkLst>
-        </pc:spChg>
-        <pc:spChg chg="add mod ord">
-          <ac:chgData name="SMITH, CHRISTOPHER" userId="dd7fc2d5-9988-40ef-9498-c94fd49fd9a4" providerId="ADAL" clId="{A4BCDF6F-2330-4DAF-BA3A-CC418D4738BE}" dt="2022-02-27T21:30:24.257" v="7926" actId="700"/>
-          <ac:spMkLst>
-            <pc:docMk/>
-            <pc:sldMk cId="2115741306" sldId="276"/>
-            <ac:spMk id="5" creationId="{556DB67A-C2B0-4E13-8CC6-5A190D39AAC3}"/>
-          </ac:spMkLst>
-        </pc:spChg>
-      </pc:sldChg>
-      <pc:sldChg chg="modSp add mod ord">
-        <pc:chgData name="SMITH, CHRISTOPHER" userId="dd7fc2d5-9988-40ef-9498-c94fd49fd9a4" providerId="ADAL" clId="{A4BCDF6F-2330-4DAF-BA3A-CC418D4738BE}" dt="2022-02-27T21:30:38.779" v="7937" actId="20577"/>
-        <pc:sldMkLst>
-          <pc:docMk/>
-          <pc:sldMk cId="1278696310" sldId="277"/>
-        </pc:sldMkLst>
-        <pc:spChg chg="mod">
-          <ac:chgData name="SMITH, CHRISTOPHER" userId="dd7fc2d5-9988-40ef-9498-c94fd49fd9a4" providerId="ADAL" clId="{A4BCDF6F-2330-4DAF-BA3A-CC418D4738BE}" dt="2022-02-27T21:30:38.779" v="7937" actId="20577"/>
-          <ac:spMkLst>
-            <pc:docMk/>
-            <pc:sldMk cId="1278696310" sldId="277"/>
-            <ac:spMk id="4" creationId="{814BFB6E-7834-4E90-8F3E-E54FD1EEB3E1}"/>
-          </ac:spMkLst>
-        </pc:spChg>
-      </pc:sldChg>
-      <pc:sldChg chg="modSp add mod ord">
-        <pc:chgData name="SMITH, CHRISTOPHER" userId="dd7fc2d5-9988-40ef-9498-c94fd49fd9a4" providerId="ADAL" clId="{A4BCDF6F-2330-4DAF-BA3A-CC418D4738BE}" dt="2022-02-27T21:32:24.310" v="7946" actId="20577"/>
-        <pc:sldMkLst>
-          <pc:docMk/>
-          <pc:sldMk cId="611013058" sldId="278"/>
-        </pc:sldMkLst>
-        <pc:spChg chg="mod">
-          <ac:chgData name="SMITH, CHRISTOPHER" userId="dd7fc2d5-9988-40ef-9498-c94fd49fd9a4" providerId="ADAL" clId="{A4BCDF6F-2330-4DAF-BA3A-CC418D4738BE}" dt="2022-02-27T21:32:24.310" v="7946" actId="20577"/>
-          <ac:spMkLst>
-            <pc:docMk/>
-            <pc:sldMk cId="611013058" sldId="278"/>
-            <ac:spMk id="4" creationId="{814BFB6E-7834-4E90-8F3E-E54FD1EEB3E1}"/>
-          </ac:spMkLst>
-        </pc:spChg>
-      </pc:sldChg>
-      <pc:sldChg chg="modSp new mod">
-        <pc:chgData name="SMITH, CHRISTOPHER" userId="dd7fc2d5-9988-40ef-9498-c94fd49fd9a4" providerId="ADAL" clId="{A4BCDF6F-2330-4DAF-BA3A-CC418D4738BE}" dt="2022-02-27T21:41:37.140" v="9490" actId="20577"/>
-        <pc:sldMkLst>
-          <pc:docMk/>
-          <pc:sldMk cId="1451598975" sldId="279"/>
-        </pc:sldMkLst>
-        <pc:spChg chg="mod">
-          <ac:chgData name="SMITH, CHRISTOPHER" userId="dd7fc2d5-9988-40ef-9498-c94fd49fd9a4" providerId="ADAL" clId="{A4BCDF6F-2330-4DAF-BA3A-CC418D4738BE}" dt="2022-02-27T21:36:53.290" v="8778" actId="20577"/>
-          <ac:spMkLst>
-            <pc:docMk/>
-            <pc:sldMk cId="1451598975" sldId="279"/>
-            <ac:spMk id="2" creationId="{E2073E01-FC54-4F8E-A04B-7E103F82BA28}"/>
-          </ac:spMkLst>
-        </pc:spChg>
-        <pc:spChg chg="mod">
-          <ac:chgData name="SMITH, CHRISTOPHER" userId="dd7fc2d5-9988-40ef-9498-c94fd49fd9a4" providerId="ADAL" clId="{A4BCDF6F-2330-4DAF-BA3A-CC418D4738BE}" dt="2022-02-27T21:41:37.140" v="9490" actId="20577"/>
-          <ac:spMkLst>
-            <pc:docMk/>
-            <pc:sldMk cId="1451598975" sldId="279"/>
-            <ac:spMk id="3" creationId="{316E2737-ABBC-469E-8F1E-CB19E8CD9D55}"/>
-          </ac:spMkLst>
-        </pc:spChg>
-      </pc:sldChg>
-      <pc:sldChg chg="modSp new mod">
-        <pc:chgData name="SMITH, CHRISTOPHER" userId="dd7fc2d5-9988-40ef-9498-c94fd49fd9a4" providerId="ADAL" clId="{A4BCDF6F-2330-4DAF-BA3A-CC418D4738BE}" dt="2022-02-27T21:46:04.061" v="9995" actId="20577"/>
-        <pc:sldMkLst>
-          <pc:docMk/>
-          <pc:sldMk cId="2519579051" sldId="280"/>
-        </pc:sldMkLst>
-        <pc:spChg chg="mod">
-          <ac:chgData name="SMITH, CHRISTOPHER" userId="dd7fc2d5-9988-40ef-9498-c94fd49fd9a4" providerId="ADAL" clId="{A4BCDF6F-2330-4DAF-BA3A-CC418D4738BE}" dt="2022-02-27T21:43:31.406" v="9502" actId="20577"/>
-          <ac:spMkLst>
-            <pc:docMk/>
-            <pc:sldMk cId="2519579051" sldId="280"/>
-            <ac:spMk id="2" creationId="{90812C75-4E2F-4369-8C36-719643390272}"/>
-          </ac:spMkLst>
-        </pc:spChg>
-        <pc:spChg chg="mod">
-          <ac:chgData name="SMITH, CHRISTOPHER" userId="dd7fc2d5-9988-40ef-9498-c94fd49fd9a4" providerId="ADAL" clId="{A4BCDF6F-2330-4DAF-BA3A-CC418D4738BE}" dt="2022-02-27T21:46:04.061" v="9995" actId="20577"/>
-          <ac:spMkLst>
-            <pc:docMk/>
-            <pc:sldMk cId="2519579051" sldId="280"/>
-            <ac:spMk id="3" creationId="{C4A8F0C2-841F-4768-9CED-A04B8835D5C8}"/>
-          </ac:spMkLst>
-        </pc:spChg>
-      </pc:sldChg>
-      <pc:sldChg chg="modSp new mod">
-        <pc:chgData name="SMITH, CHRISTOPHER" userId="dd7fc2d5-9988-40ef-9498-c94fd49fd9a4" providerId="ADAL" clId="{A4BCDF6F-2330-4DAF-BA3A-CC418D4738BE}" dt="2022-02-27T21:52:03.369" v="11008" actId="20577"/>
-        <pc:sldMkLst>
-          <pc:docMk/>
-          <pc:sldMk cId="1819768935" sldId="281"/>
-        </pc:sldMkLst>
-        <pc:spChg chg="mod">
-          <ac:chgData name="SMITH, CHRISTOPHER" userId="dd7fc2d5-9988-40ef-9498-c94fd49fd9a4" providerId="ADAL" clId="{A4BCDF6F-2330-4DAF-BA3A-CC418D4738BE}" dt="2022-02-27T21:46:18.991" v="10023" actId="20577"/>
-          <ac:spMkLst>
-            <pc:docMk/>
-            <pc:sldMk cId="1819768935" sldId="281"/>
-            <ac:spMk id="2" creationId="{8EFB1926-AD30-43E0-B87F-E55D66885926}"/>
-          </ac:spMkLst>
-        </pc:spChg>
-        <pc:spChg chg="mod">
-          <ac:chgData name="SMITH, CHRISTOPHER" userId="dd7fc2d5-9988-40ef-9498-c94fd49fd9a4" providerId="ADAL" clId="{A4BCDF6F-2330-4DAF-BA3A-CC418D4738BE}" dt="2022-02-27T21:52:03.369" v="11008" actId="20577"/>
-          <ac:spMkLst>
-            <pc:docMk/>
-            <pc:sldMk cId="1819768935" sldId="281"/>
-            <ac:spMk id="3" creationId="{46929FE6-9B88-4789-8BBB-1C5E81B7A8FF}"/>
-          </ac:spMkLst>
-        </pc:spChg>
-      </pc:sldChg>
-      <pc:sldChg chg="modSp new mod">
-        <pc:chgData name="SMITH, CHRISTOPHER" userId="dd7fc2d5-9988-40ef-9498-c94fd49fd9a4" providerId="ADAL" clId="{A4BCDF6F-2330-4DAF-BA3A-CC418D4738BE}" dt="2022-02-27T21:54:19.381" v="11147" actId="20577"/>
-        <pc:sldMkLst>
-          <pc:docMk/>
-          <pc:sldMk cId="3737898746" sldId="282"/>
-        </pc:sldMkLst>
-        <pc:spChg chg="mod">
-          <ac:chgData name="SMITH, CHRISTOPHER" userId="dd7fc2d5-9988-40ef-9498-c94fd49fd9a4" providerId="ADAL" clId="{A4BCDF6F-2330-4DAF-BA3A-CC418D4738BE}" dt="2022-02-27T21:48:55.269" v="10482" actId="20577"/>
-          <ac:spMkLst>
-            <pc:docMk/>
-            <pc:sldMk cId="3737898746" sldId="282"/>
-            <ac:spMk id="2" creationId="{C27E5347-9720-4DC8-A9B4-E67AD2B060D8}"/>
-          </ac:spMkLst>
-        </pc:spChg>
-        <pc:spChg chg="mod">
-          <ac:chgData name="SMITH, CHRISTOPHER" userId="dd7fc2d5-9988-40ef-9498-c94fd49fd9a4" providerId="ADAL" clId="{A4BCDF6F-2330-4DAF-BA3A-CC418D4738BE}" dt="2022-02-27T21:54:19.381" v="11147" actId="20577"/>
-          <ac:spMkLst>
-            <pc:docMk/>
-            <pc:sldMk cId="3737898746" sldId="282"/>
-            <ac:spMk id="3" creationId="{62C4350D-7CD4-4CFB-A5A9-C17AA2FDBC50}"/>
-          </ac:spMkLst>
-        </pc:spChg>
-      </pc:sldChg>
+    </pc:docChg>
+  </pc:docChgLst>
+  <pc:docChgLst>
+    <pc:chgData name="Christopher Smith" userId="dd7fc2d5-9988-40ef-9498-c94fd49fd9a4" providerId="ADAL" clId="{324B4DE8-67CF-452F-940E-9E5B798B3587}"/>
+    <pc:docChg chg="undo custSel addSld delSld modSld">
+      <pc:chgData name="Christopher Smith" userId="dd7fc2d5-9988-40ef-9498-c94fd49fd9a4" providerId="ADAL" clId="{324B4DE8-67CF-452F-940E-9E5B798B3587}" dt="2022-02-14T13:25:41.436" v="3034"/>
+      <pc:docMkLst>
+        <pc:docMk/>
+      </pc:docMkLst>
     </pc:docChg>
   </pc:docChgLst>
   <pc:docChgLst>
@@ -668,267 +294,9 @@
     </pc:docChg>
   </pc:docChgLst>
   <pc:docChgLst>
-    <pc:chgData name="Christopher Smith" userId="dd7fc2d5-9988-40ef-9498-c94fd49fd9a4" providerId="ADAL" clId="{F9EAC55B-E4CB-4EC9-93C5-0BCCD297DE25}"/>
-    <pc:docChg chg="custSel modSld">
-      <pc:chgData name="Christopher Smith" userId="dd7fc2d5-9988-40ef-9498-c94fd49fd9a4" providerId="ADAL" clId="{F9EAC55B-E4CB-4EC9-93C5-0BCCD297DE25}" dt="2022-02-07T18:41:39.243" v="592"/>
-      <pc:docMkLst>
-        <pc:docMk/>
-      </pc:docMkLst>
-    </pc:docChg>
-  </pc:docChgLst>
-  <pc:docChgLst>
     <pc:chgData name="Christopher Smith" userId="dd7fc2d5-9988-40ef-9498-c94fd49fd9a4" providerId="ADAL" clId="{C276C02F-050A-4F17-94C1-E5D14F895005}"/>
     <pc:docChg chg="custSel addSld delSld modSld">
       <pc:chgData name="Christopher Smith" userId="dd7fc2d5-9988-40ef-9498-c94fd49fd9a4" providerId="ADAL" clId="{C276C02F-050A-4F17-94C1-E5D14F895005}" dt="2022-02-22T13:20:38.303" v="3194"/>
-      <pc:docMkLst>
-        <pc:docMk/>
-      </pc:docMkLst>
-      <pc:sldChg chg="del">
-        <pc:chgData name="Christopher Smith" userId="dd7fc2d5-9988-40ef-9498-c94fd49fd9a4" providerId="ADAL" clId="{C276C02F-050A-4F17-94C1-E5D14F895005}" dt="2022-02-22T12:40:23.759" v="1" actId="2696"/>
-        <pc:sldMkLst>
-          <pc:docMk/>
-          <pc:sldMk cId="502978060" sldId="257"/>
-        </pc:sldMkLst>
-      </pc:sldChg>
-      <pc:sldChg chg="modSp add modAnim">
-        <pc:chgData name="Christopher Smith" userId="dd7fc2d5-9988-40ef-9498-c94fd49fd9a4" providerId="ADAL" clId="{C276C02F-050A-4F17-94C1-E5D14F895005}" dt="2022-02-22T13:20:23.328" v="3187"/>
-        <pc:sldMkLst>
-          <pc:docMk/>
-          <pc:sldMk cId="2507572621" sldId="257"/>
-        </pc:sldMkLst>
-        <pc:spChg chg="mod">
-          <ac:chgData name="Christopher Smith" userId="dd7fc2d5-9988-40ef-9498-c94fd49fd9a4" providerId="ADAL" clId="{C276C02F-050A-4F17-94C1-E5D14F895005}" dt="2022-02-22T12:40:36.091" v="29" actId="20577"/>
-          <ac:spMkLst>
-            <pc:docMk/>
-            <pc:sldMk cId="2507572621" sldId="257"/>
-            <ac:spMk id="2" creationId="{D0E77A80-AE59-4CBC-B8D9-CDDDBEAC2587}"/>
-          </ac:spMkLst>
-        </pc:spChg>
-        <pc:spChg chg="mod">
-          <ac:chgData name="Christopher Smith" userId="dd7fc2d5-9988-40ef-9498-c94fd49fd9a4" providerId="ADAL" clId="{C276C02F-050A-4F17-94C1-E5D14F895005}" dt="2022-02-22T12:45:22.849" v="634" actId="20577"/>
-          <ac:spMkLst>
-            <pc:docMk/>
-            <pc:sldMk cId="2507572621" sldId="257"/>
-            <ac:spMk id="3" creationId="{1AB676AE-FBE7-441C-834B-BFED32916760}"/>
-          </ac:spMkLst>
-        </pc:spChg>
-      </pc:sldChg>
-      <pc:sldChg chg="modSp add modAnim">
-        <pc:chgData name="Christopher Smith" userId="dd7fc2d5-9988-40ef-9498-c94fd49fd9a4" providerId="ADAL" clId="{C276C02F-050A-4F17-94C1-E5D14F895005}" dt="2022-02-22T13:20:33.913" v="3192"/>
-        <pc:sldMkLst>
-          <pc:docMk/>
-          <pc:sldMk cId="1424444010" sldId="258"/>
-        </pc:sldMkLst>
-        <pc:spChg chg="mod">
-          <ac:chgData name="Christopher Smith" userId="dd7fc2d5-9988-40ef-9498-c94fd49fd9a4" providerId="ADAL" clId="{C276C02F-050A-4F17-94C1-E5D14F895005}" dt="2022-02-22T12:45:37.205" v="646" actId="20577"/>
-          <ac:spMkLst>
-            <pc:docMk/>
-            <pc:sldMk cId="1424444010" sldId="258"/>
-            <ac:spMk id="2" creationId="{FCB39660-12BD-4E8B-9AAC-D86B48068251}"/>
-          </ac:spMkLst>
-        </pc:spChg>
-        <pc:spChg chg="mod">
-          <ac:chgData name="Christopher Smith" userId="dd7fc2d5-9988-40ef-9498-c94fd49fd9a4" providerId="ADAL" clId="{C276C02F-050A-4F17-94C1-E5D14F895005}" dt="2022-02-22T12:45:50.618" v="679" actId="403"/>
-          <ac:spMkLst>
-            <pc:docMk/>
-            <pc:sldMk cId="1424444010" sldId="258"/>
-            <ac:spMk id="3" creationId="{863CB25F-C717-4ACA-8879-3BADDA02FD3B}"/>
-          </ac:spMkLst>
-        </pc:spChg>
-      </pc:sldChg>
-      <pc:sldChg chg="del">
-        <pc:chgData name="Christopher Smith" userId="dd7fc2d5-9988-40ef-9498-c94fd49fd9a4" providerId="ADAL" clId="{C276C02F-050A-4F17-94C1-E5D14F895005}" dt="2022-02-22T12:40:26.354" v="3" actId="2696"/>
-        <pc:sldMkLst>
-          <pc:docMk/>
-          <pc:sldMk cId="1720946084" sldId="258"/>
-        </pc:sldMkLst>
-      </pc:sldChg>
-      <pc:sldChg chg="modSp add modAnim">
-        <pc:chgData name="Christopher Smith" userId="dd7fc2d5-9988-40ef-9498-c94fd49fd9a4" providerId="ADAL" clId="{C276C02F-050A-4F17-94C1-E5D14F895005}" dt="2022-02-22T13:20:25.786" v="3188"/>
-        <pc:sldMkLst>
-          <pc:docMk/>
-          <pc:sldMk cId="1215748744" sldId="259"/>
-        </pc:sldMkLst>
-        <pc:spChg chg="mod">
-          <ac:chgData name="Christopher Smith" userId="dd7fc2d5-9988-40ef-9498-c94fd49fd9a4" providerId="ADAL" clId="{C276C02F-050A-4F17-94C1-E5D14F895005}" dt="2022-02-22T12:46:36.975" v="709" actId="20577"/>
-          <ac:spMkLst>
-            <pc:docMk/>
-            <pc:sldMk cId="1215748744" sldId="259"/>
-            <ac:spMk id="2" creationId="{4C11E58D-ED23-4CB2-B636-87B952B4EE52}"/>
-          </ac:spMkLst>
-        </pc:spChg>
-        <pc:spChg chg="mod">
-          <ac:chgData name="Christopher Smith" userId="dd7fc2d5-9988-40ef-9498-c94fd49fd9a4" providerId="ADAL" clId="{C276C02F-050A-4F17-94C1-E5D14F895005}" dt="2022-02-22T12:48:39.966" v="1103" actId="20577"/>
-          <ac:spMkLst>
-            <pc:docMk/>
-            <pc:sldMk cId="1215748744" sldId="259"/>
-            <ac:spMk id="3" creationId="{651E673F-A5BB-4FA2-A1B0-36E9BE9CFDA5}"/>
-          </ac:spMkLst>
-        </pc:spChg>
-      </pc:sldChg>
-      <pc:sldChg chg="del">
-        <pc:chgData name="Christopher Smith" userId="dd7fc2d5-9988-40ef-9498-c94fd49fd9a4" providerId="ADAL" clId="{C276C02F-050A-4F17-94C1-E5D14F895005}" dt="2022-02-22T12:40:27.019" v="4" actId="2696"/>
-        <pc:sldMkLst>
-          <pc:docMk/>
-          <pc:sldMk cId="2815643655" sldId="259"/>
-        </pc:sldMkLst>
-      </pc:sldChg>
-      <pc:sldChg chg="del">
-        <pc:chgData name="Christopher Smith" userId="dd7fc2d5-9988-40ef-9498-c94fd49fd9a4" providerId="ADAL" clId="{C276C02F-050A-4F17-94C1-E5D14F895005}" dt="2022-02-22T12:40:17.448" v="0" actId="2696"/>
-        <pc:sldMkLst>
-          <pc:docMk/>
-          <pc:sldMk cId="1711072872" sldId="260"/>
-        </pc:sldMkLst>
-      </pc:sldChg>
-      <pc:sldChg chg="modSp add modAnim">
-        <pc:chgData name="Christopher Smith" userId="dd7fc2d5-9988-40ef-9498-c94fd49fd9a4" providerId="ADAL" clId="{C276C02F-050A-4F17-94C1-E5D14F895005}" dt="2022-02-22T13:20:31.904" v="3191"/>
-        <pc:sldMkLst>
-          <pc:docMk/>
-          <pc:sldMk cId="3057571475" sldId="260"/>
-        </pc:sldMkLst>
-        <pc:spChg chg="mod">
-          <ac:chgData name="Christopher Smith" userId="dd7fc2d5-9988-40ef-9498-c94fd49fd9a4" providerId="ADAL" clId="{C276C02F-050A-4F17-94C1-E5D14F895005}" dt="2022-02-22T12:49:01.085" v="1111" actId="20577"/>
-          <ac:spMkLst>
-            <pc:docMk/>
-            <pc:sldMk cId="3057571475" sldId="260"/>
-            <ac:spMk id="2" creationId="{7C41105E-B544-4BAA-A6C8-A6766BAF05EC}"/>
-          </ac:spMkLst>
-        </pc:spChg>
-        <pc:spChg chg="mod">
-          <ac:chgData name="Christopher Smith" userId="dd7fc2d5-9988-40ef-9498-c94fd49fd9a4" providerId="ADAL" clId="{C276C02F-050A-4F17-94C1-E5D14F895005}" dt="2022-02-22T13:03:21.473" v="2372" actId="20577"/>
-          <ac:spMkLst>
-            <pc:docMk/>
-            <pc:sldMk cId="3057571475" sldId="260"/>
-            <ac:spMk id="3" creationId="{9D469C20-EFAF-4C03-BA6A-73BE9E4988B2}"/>
-          </ac:spMkLst>
-        </pc:spChg>
-      </pc:sldChg>
-      <pc:sldChg chg="modSp add modAnim">
-        <pc:chgData name="Christopher Smith" userId="dd7fc2d5-9988-40ef-9498-c94fd49fd9a4" providerId="ADAL" clId="{C276C02F-050A-4F17-94C1-E5D14F895005}" dt="2022-02-22T13:20:27.555" v="3189"/>
-        <pc:sldMkLst>
-          <pc:docMk/>
-          <pc:sldMk cId="1700104824" sldId="261"/>
-        </pc:sldMkLst>
-        <pc:spChg chg="mod">
-          <ac:chgData name="Christopher Smith" userId="dd7fc2d5-9988-40ef-9498-c94fd49fd9a4" providerId="ADAL" clId="{C276C02F-050A-4F17-94C1-E5D14F895005}" dt="2022-02-22T12:58:24.564" v="1606" actId="20577"/>
-          <ac:spMkLst>
-            <pc:docMk/>
-            <pc:sldMk cId="1700104824" sldId="261"/>
-            <ac:spMk id="2" creationId="{19C59E81-F36B-4A76-A9E5-87728D7932B7}"/>
-          </ac:spMkLst>
-        </pc:spChg>
-        <pc:spChg chg="mod">
-          <ac:chgData name="Christopher Smith" userId="dd7fc2d5-9988-40ef-9498-c94fd49fd9a4" providerId="ADAL" clId="{C276C02F-050A-4F17-94C1-E5D14F895005}" dt="2022-02-22T12:58:41.093" v="1696" actId="20577"/>
-          <ac:spMkLst>
-            <pc:docMk/>
-            <pc:sldMk cId="1700104824" sldId="261"/>
-            <ac:spMk id="3" creationId="{961A5809-06D0-498A-B193-5F848BE93CE7}"/>
-          </ac:spMkLst>
-        </pc:spChg>
-      </pc:sldChg>
-      <pc:sldChg chg="del">
-        <pc:chgData name="Christopher Smith" userId="dd7fc2d5-9988-40ef-9498-c94fd49fd9a4" providerId="ADAL" clId="{C276C02F-050A-4F17-94C1-E5D14F895005}" dt="2022-02-22T12:40:29.159" v="6" actId="2696"/>
-        <pc:sldMkLst>
-          <pc:docMk/>
-          <pc:sldMk cId="3217793404" sldId="261"/>
-        </pc:sldMkLst>
-      </pc:sldChg>
-      <pc:sldChg chg="del">
-        <pc:chgData name="Christopher Smith" userId="dd7fc2d5-9988-40ef-9498-c94fd49fd9a4" providerId="ADAL" clId="{C276C02F-050A-4F17-94C1-E5D14F895005}" dt="2022-02-22T12:40:25.776" v="2" actId="2696"/>
-        <pc:sldMkLst>
-          <pc:docMk/>
-          <pc:sldMk cId="167472778" sldId="262"/>
-        </pc:sldMkLst>
-      </pc:sldChg>
-      <pc:sldChg chg="modSp add modAnim">
-        <pc:chgData name="Christopher Smith" userId="dd7fc2d5-9988-40ef-9498-c94fd49fd9a4" providerId="ADAL" clId="{C276C02F-050A-4F17-94C1-E5D14F895005}" dt="2022-02-22T13:20:29.726" v="3190"/>
-        <pc:sldMkLst>
-          <pc:docMk/>
-          <pc:sldMk cId="279129629" sldId="262"/>
-        </pc:sldMkLst>
-        <pc:spChg chg="mod">
-          <ac:chgData name="Christopher Smith" userId="dd7fc2d5-9988-40ef-9498-c94fd49fd9a4" providerId="ADAL" clId="{C276C02F-050A-4F17-94C1-E5D14F895005}" dt="2022-02-22T12:59:08.195" v="1708" actId="20577"/>
-          <ac:spMkLst>
-            <pc:docMk/>
-            <pc:sldMk cId="279129629" sldId="262"/>
-            <ac:spMk id="2" creationId="{DE834582-A431-492D-A38B-01CCB4258766}"/>
-          </ac:spMkLst>
-        </pc:spChg>
-        <pc:spChg chg="mod">
-          <ac:chgData name="Christopher Smith" userId="dd7fc2d5-9988-40ef-9498-c94fd49fd9a4" providerId="ADAL" clId="{C276C02F-050A-4F17-94C1-E5D14F895005}" dt="2022-02-22T13:03:07.937" v="2352" actId="20577"/>
-          <ac:spMkLst>
-            <pc:docMk/>
-            <pc:sldMk cId="279129629" sldId="262"/>
-            <ac:spMk id="3" creationId="{CDD3E157-5CD2-47C5-8563-9D39A00311A7}"/>
-          </ac:spMkLst>
-        </pc:spChg>
-      </pc:sldChg>
-      <pc:sldChg chg="modSp add modAnim">
-        <pc:chgData name="Christopher Smith" userId="dd7fc2d5-9988-40ef-9498-c94fd49fd9a4" providerId="ADAL" clId="{C276C02F-050A-4F17-94C1-E5D14F895005}" dt="2022-02-22T13:20:36.153" v="3193"/>
-        <pc:sldMkLst>
-          <pc:docMk/>
-          <pc:sldMk cId="689825584" sldId="263"/>
-        </pc:sldMkLst>
-        <pc:spChg chg="mod">
-          <ac:chgData name="Christopher Smith" userId="dd7fc2d5-9988-40ef-9498-c94fd49fd9a4" providerId="ADAL" clId="{C276C02F-050A-4F17-94C1-E5D14F895005}" dt="2022-02-22T13:03:36.944" v="2403" actId="20577"/>
-          <ac:spMkLst>
-            <pc:docMk/>
-            <pc:sldMk cId="689825584" sldId="263"/>
-            <ac:spMk id="2" creationId="{B38183FB-ABB9-4B2D-B6EC-26C688D49BD7}"/>
-          </ac:spMkLst>
-        </pc:spChg>
-        <pc:spChg chg="mod">
-          <ac:chgData name="Christopher Smith" userId="dd7fc2d5-9988-40ef-9498-c94fd49fd9a4" providerId="ADAL" clId="{C276C02F-050A-4F17-94C1-E5D14F895005}" dt="2022-02-22T13:05:42.049" v="2921" actId="20577"/>
-          <ac:spMkLst>
-            <pc:docMk/>
-            <pc:sldMk cId="689825584" sldId="263"/>
-            <ac:spMk id="3" creationId="{C3487442-AAD4-4D34-82C2-90BCA69B3D67}"/>
-          </ac:spMkLst>
-        </pc:spChg>
-      </pc:sldChg>
-      <pc:sldChg chg="add del">
-        <pc:chgData name="Christopher Smith" userId="dd7fc2d5-9988-40ef-9498-c94fd49fd9a4" providerId="ADAL" clId="{C276C02F-050A-4F17-94C1-E5D14F895005}" dt="2022-02-22T13:03:10.743" v="2354"/>
-        <pc:sldMkLst>
-          <pc:docMk/>
-          <pc:sldMk cId="1266505754" sldId="263"/>
-        </pc:sldMkLst>
-      </pc:sldChg>
-      <pc:sldChg chg="del">
-        <pc:chgData name="Christopher Smith" userId="dd7fc2d5-9988-40ef-9498-c94fd49fd9a4" providerId="ADAL" clId="{C276C02F-050A-4F17-94C1-E5D14F895005}" dt="2022-02-22T12:40:27.625" v="5" actId="2696"/>
-        <pc:sldMkLst>
-          <pc:docMk/>
-          <pc:sldMk cId="3708131831" sldId="263"/>
-        </pc:sldMkLst>
-      </pc:sldChg>
-      <pc:sldChg chg="modSp add modAnim">
-        <pc:chgData name="Christopher Smith" userId="dd7fc2d5-9988-40ef-9498-c94fd49fd9a4" providerId="ADAL" clId="{C276C02F-050A-4F17-94C1-E5D14F895005}" dt="2022-02-22T13:20:38.303" v="3194"/>
-        <pc:sldMkLst>
-          <pc:docMk/>
-          <pc:sldMk cId="273950689" sldId="264"/>
-        </pc:sldMkLst>
-        <pc:spChg chg="mod">
-          <ac:chgData name="Christopher Smith" userId="dd7fc2d5-9988-40ef-9498-c94fd49fd9a4" providerId="ADAL" clId="{C276C02F-050A-4F17-94C1-E5D14F895005}" dt="2022-02-22T13:07:34.350" v="2953" actId="20577"/>
-          <ac:spMkLst>
-            <pc:docMk/>
-            <pc:sldMk cId="273950689" sldId="264"/>
-            <ac:spMk id="2" creationId="{31892E32-2810-4442-9C73-D5DD6C7CF506}"/>
-          </ac:spMkLst>
-        </pc:spChg>
-        <pc:spChg chg="mod">
-          <ac:chgData name="Christopher Smith" userId="dd7fc2d5-9988-40ef-9498-c94fd49fd9a4" providerId="ADAL" clId="{C276C02F-050A-4F17-94C1-E5D14F895005}" dt="2022-02-22T13:09:39.622" v="3186" actId="400"/>
-          <ac:spMkLst>
-            <pc:docMk/>
-            <pc:sldMk cId="273950689" sldId="264"/>
-            <ac:spMk id="3" creationId="{135BFA99-F3B1-4D16-BD1C-9AE8EA64E18D}"/>
-          </ac:spMkLst>
-        </pc:spChg>
-      </pc:sldChg>
-    </pc:docChg>
-  </pc:docChgLst>
-  <pc:docChgLst>
-    <pc:chgData name="Christopher Smith" userId="dd7fc2d5-9988-40ef-9498-c94fd49fd9a4" providerId="ADAL" clId="{324B4DE8-67CF-452F-940E-9E5B798B3587}"/>
-    <pc:docChg chg="undo custSel addSld delSld modSld">
-      <pc:chgData name="Christopher Smith" userId="dd7fc2d5-9988-40ef-9498-c94fd49fd9a4" providerId="ADAL" clId="{324B4DE8-67CF-452F-940E-9E5B798B3587}" dt="2022-02-14T13:25:41.436" v="3034"/>
       <pc:docMkLst>
         <pc:docMk/>
       </pc:docMkLst>
@@ -962,6 +330,38 @@
             <pc:docMk/>
             <pc:sldMk cId="2854341820" sldId="256"/>
             <ac:spMk id="2" creationId="{8416994D-544B-48E2-AE49-6ED72BA455A3}"/>
+          </ac:spMkLst>
+        </pc:spChg>
+      </pc:sldChg>
+    </pc:docChg>
+  </pc:docChgLst>
+  <pc:docChgLst>
+    <pc:chgData name="SMITH, CHRISTOPHER" userId="dd7fc2d5-9988-40ef-9498-c94fd49fd9a4" providerId="ADAL" clId="{A4BCDF6F-2330-4DAF-BA3A-CC418D4738BE}"/>
+    <pc:docChg chg="undo custSel addSld delSld modSld sldOrd">
+      <pc:chgData name="SMITH, CHRISTOPHER" userId="dd7fc2d5-9988-40ef-9498-c94fd49fd9a4" providerId="ADAL" clId="{A4BCDF6F-2330-4DAF-BA3A-CC418D4738BE}" dt="2022-02-27T21:54:19.381" v="11147" actId="20577"/>
+      <pc:docMkLst>
+        <pc:docMk/>
+      </pc:docMkLst>
+      <pc:sldChg chg="modSp new mod ord">
+        <pc:chgData name="SMITH, CHRISTOPHER" userId="dd7fc2d5-9988-40ef-9498-c94fd49fd9a4" providerId="ADAL" clId="{A4BCDF6F-2330-4DAF-BA3A-CC418D4738BE}" dt="2022-02-27T20:25:51.119" v="1176" actId="20577"/>
+        <pc:sldMkLst>
+          <pc:docMk/>
+          <pc:sldMk cId="4169265430" sldId="264"/>
+        </pc:sldMkLst>
+        <pc:spChg chg="mod">
+          <ac:chgData name="SMITH, CHRISTOPHER" userId="dd7fc2d5-9988-40ef-9498-c94fd49fd9a4" providerId="ADAL" clId="{A4BCDF6F-2330-4DAF-BA3A-CC418D4738BE}" dt="2022-02-27T20:19:42.263" v="715" actId="20577"/>
+          <ac:spMkLst>
+            <pc:docMk/>
+            <pc:sldMk cId="4169265430" sldId="264"/>
+            <ac:spMk id="2" creationId="{266F4D9C-8850-40AC-AB57-67557E0AB60B}"/>
+          </ac:spMkLst>
+        </pc:spChg>
+        <pc:spChg chg="mod">
+          <ac:chgData name="SMITH, CHRISTOPHER" userId="dd7fc2d5-9988-40ef-9498-c94fd49fd9a4" providerId="ADAL" clId="{A4BCDF6F-2330-4DAF-BA3A-CC418D4738BE}" dt="2022-02-27T20:25:51.119" v="1176" actId="20577"/>
+          <ac:spMkLst>
+            <pc:docMk/>
+            <pc:sldMk cId="4169265430" sldId="264"/>
+            <ac:spMk id="3" creationId="{CAB66B1E-DCF9-43D3-90A2-5FF2C28509D7}"/>
           </ac:spMkLst>
         </pc:spChg>
       </pc:sldChg>
@@ -1117,7 +517,7 @@
           <a:p>
             <a:fld id="{158B72E8-B12F-4F24-84EA-C15599633662}" type="datetimeFigureOut">
               <a:rPr lang="en-US" smtClean="0"/>
-              <a:t>3/6/2022</a:t>
+              <a:t>3/7/2022</a:t>
             </a:fld>
             <a:endParaRPr lang="en-US"/>
           </a:p>
@@ -1315,7 +715,7 @@
           <a:p>
             <a:fld id="{158B72E8-B12F-4F24-84EA-C15599633662}" type="datetimeFigureOut">
               <a:rPr lang="en-US" smtClean="0"/>
-              <a:t>3/6/2022</a:t>
+              <a:t>3/7/2022</a:t>
             </a:fld>
             <a:endParaRPr lang="en-US"/>
           </a:p>
@@ -1523,7 +923,7 @@
           <a:p>
             <a:fld id="{158B72E8-B12F-4F24-84EA-C15599633662}" type="datetimeFigureOut">
               <a:rPr lang="en-US" smtClean="0"/>
-              <a:t>3/6/2022</a:t>
+              <a:t>3/7/2022</a:t>
             </a:fld>
             <a:endParaRPr lang="en-US"/>
           </a:p>
@@ -1721,7 +1121,7 @@
           <a:p>
             <a:fld id="{158B72E8-B12F-4F24-84EA-C15599633662}" type="datetimeFigureOut">
               <a:rPr lang="en-US" smtClean="0"/>
-              <a:t>3/6/2022</a:t>
+              <a:t>3/7/2022</a:t>
             </a:fld>
             <a:endParaRPr lang="en-US"/>
           </a:p>
@@ -1996,7 +1396,7 @@
           <a:p>
             <a:fld id="{158B72E8-B12F-4F24-84EA-C15599633662}" type="datetimeFigureOut">
               <a:rPr lang="en-US" smtClean="0"/>
-              <a:t>3/6/2022</a:t>
+              <a:t>3/7/2022</a:t>
             </a:fld>
             <a:endParaRPr lang="en-US"/>
           </a:p>
@@ -2261,7 +1661,7 @@
           <a:p>
             <a:fld id="{158B72E8-B12F-4F24-84EA-C15599633662}" type="datetimeFigureOut">
               <a:rPr lang="en-US" smtClean="0"/>
-              <a:t>3/6/2022</a:t>
+              <a:t>3/7/2022</a:t>
             </a:fld>
             <a:endParaRPr lang="en-US"/>
           </a:p>
@@ -2673,7 +2073,7 @@
           <a:p>
             <a:fld id="{158B72E8-B12F-4F24-84EA-C15599633662}" type="datetimeFigureOut">
               <a:rPr lang="en-US" smtClean="0"/>
-              <a:t>3/6/2022</a:t>
+              <a:t>3/7/2022</a:t>
             </a:fld>
             <a:endParaRPr lang="en-US"/>
           </a:p>
@@ -2814,7 +2214,7 @@
           <a:p>
             <a:fld id="{158B72E8-B12F-4F24-84EA-C15599633662}" type="datetimeFigureOut">
               <a:rPr lang="en-US" smtClean="0"/>
-              <a:t>3/6/2022</a:t>
+              <a:t>3/7/2022</a:t>
             </a:fld>
             <a:endParaRPr lang="en-US"/>
           </a:p>
@@ -2927,7 +2327,7 @@
           <a:p>
             <a:fld id="{158B72E8-B12F-4F24-84EA-C15599633662}" type="datetimeFigureOut">
               <a:rPr lang="en-US" smtClean="0"/>
-              <a:t>3/6/2022</a:t>
+              <a:t>3/7/2022</a:t>
             </a:fld>
             <a:endParaRPr lang="en-US"/>
           </a:p>
@@ -3238,7 +2638,7 @@
           <a:p>
             <a:fld id="{158B72E8-B12F-4F24-84EA-C15599633662}" type="datetimeFigureOut">
               <a:rPr lang="en-US" smtClean="0"/>
-              <a:t>3/6/2022</a:t>
+              <a:t>3/7/2022</a:t>
             </a:fld>
             <a:endParaRPr lang="en-US"/>
           </a:p>
@@ -3526,7 +2926,7 @@
           <a:p>
             <a:fld id="{158B72E8-B12F-4F24-84EA-C15599633662}" type="datetimeFigureOut">
               <a:rPr lang="en-US" smtClean="0"/>
-              <a:t>3/6/2022</a:t>
+              <a:t>3/7/2022</a:t>
             </a:fld>
             <a:endParaRPr lang="en-US"/>
           </a:p>
@@ -3767,7 +3167,7 @@
           <a:p>
             <a:fld id="{158B72E8-B12F-4F24-84EA-C15599633662}" type="datetimeFigureOut">
               <a:rPr lang="en-US" smtClean="0"/>
-              <a:t>3/6/2022</a:t>
+              <a:t>3/7/2022</a:t>
             </a:fld>
             <a:endParaRPr lang="en-US"/>
           </a:p>
@@ -4822,631 +4222,6 @@
   <p:clrMapOvr>
     <a:masterClrMapping/>
   </p:clrMapOvr>
-</p:sld>
-</file>
-
-<file path=ppt/slides/slide17.xml><?xml version="1.0" encoding="utf-8"?>
-<p:sld xmlns:a="http://schemas.openxmlformats.org/drawingml/2006/main" xmlns:r="http://schemas.openxmlformats.org/officeDocument/2006/relationships" xmlns:p="http://schemas.openxmlformats.org/presentationml/2006/main">
-  <p:cSld>
-    <p:spTree>
-      <p:nvGrpSpPr>
-        <p:cNvPr id="1" name=""/>
-        <p:cNvGrpSpPr/>
-        <p:nvPr/>
-      </p:nvGrpSpPr>
-      <p:grpSpPr>
-        <a:xfrm>
-          <a:off x="0" y="0"/>
-          <a:ext cx="0" cy="0"/>
-          <a:chOff x="0" y="0"/>
-          <a:chExt cx="0" cy="0"/>
-        </a:xfrm>
-      </p:grpSpPr>
-      <p:sp>
-        <p:nvSpPr>
-          <p:cNvPr id="2" name="Title 1">
-            <a:extLst>
-              <a:ext uri="{FF2B5EF4-FFF2-40B4-BE49-F238E27FC236}">
-                <a16:creationId xmlns:a16="http://schemas.microsoft.com/office/drawing/2014/main" id="{502E689F-A515-4767-BD41-8CB110C768E9}"/>
-              </a:ext>
-            </a:extLst>
-          </p:cNvPr>
-          <p:cNvSpPr>
-            <a:spLocks noGrp="1"/>
-          </p:cNvSpPr>
-          <p:nvPr>
-            <p:ph type="title"/>
-          </p:nvPr>
-        </p:nvSpPr>
-        <p:spPr/>
-        <p:txBody>
-          <a:bodyPr/>
-          <a:lstStyle/>
-          <a:p>
-            <a:r>
-              <a:rPr lang="en-US" dirty="0"/>
-              <a:t>This week:</a:t>
-            </a:r>
-          </a:p>
-        </p:txBody>
-      </p:sp>
-      <p:sp>
-        <p:nvSpPr>
-          <p:cNvPr id="3" name="Content Placeholder 2">
-            <a:extLst>
-              <a:ext uri="{FF2B5EF4-FFF2-40B4-BE49-F238E27FC236}">
-                <a16:creationId xmlns:a16="http://schemas.microsoft.com/office/drawing/2014/main" id="{EA61E9FC-5184-4B34-BC57-79ADFA9BFA3E}"/>
-              </a:ext>
-            </a:extLst>
-          </p:cNvPr>
-          <p:cNvSpPr>
-            <a:spLocks noGrp="1"/>
-          </p:cNvSpPr>
-          <p:nvPr>
-            <p:ph idx="1"/>
-          </p:nvPr>
-        </p:nvSpPr>
-        <p:spPr/>
-        <p:txBody>
-          <a:bodyPr/>
-          <a:lstStyle/>
-          <a:p>
-            <a:r>
-              <a:rPr lang="en-US" dirty="0"/>
-              <a:t>There are now Reflections for the beginning AND end of week</a:t>
-            </a:r>
-          </a:p>
-          <a:p>
-            <a:r>
-              <a:rPr lang="en-US" dirty="0"/>
-              <a:t>We are upgrading our Flashcards to use objects and add performance-related questions</a:t>
-            </a:r>
-          </a:p>
-          <a:p>
-            <a:r>
-              <a:rPr lang="en-US" dirty="0"/>
-              <a:t>Lesson on using professional language to your advantage</a:t>
-            </a:r>
-          </a:p>
-          <a:p>
-            <a:r>
-              <a:rPr lang="en-US" dirty="0"/>
-              <a:t>No school this Friday</a:t>
-            </a:r>
-          </a:p>
-          <a:p>
-            <a:pPr lvl="1"/>
-            <a:r>
-              <a:rPr lang="en-US" dirty="0"/>
-              <a:t>No “Free Friday”, even with 50 </a:t>
-            </a:r>
-            <a:r>
-              <a:rPr lang="en-US" dirty="0" err="1"/>
-              <a:t>pogs</a:t>
-            </a:r>
-            <a:endParaRPr lang="en-US" dirty="0"/>
-          </a:p>
-        </p:txBody>
-      </p:sp>
-    </p:spTree>
-    <p:extLst>
-      <p:ext uri="{BB962C8B-B14F-4D97-AF65-F5344CB8AC3E}">
-        <p14:creationId xmlns:p14="http://schemas.microsoft.com/office/powerpoint/2010/main" val="1321469266"/>
-      </p:ext>
-    </p:extLst>
-  </p:cSld>
-  <p:clrMapOvr>
-    <a:masterClrMapping/>
-  </p:clrMapOvr>
-</p:sld>
-</file>
-
-<file path=ppt/slides/slide18.xml><?xml version="1.0" encoding="utf-8"?>
-<p:sld xmlns:a="http://schemas.openxmlformats.org/drawingml/2006/main" xmlns:r="http://schemas.openxmlformats.org/officeDocument/2006/relationships" xmlns:p="http://schemas.openxmlformats.org/presentationml/2006/main">
-  <p:cSld>
-    <p:spTree>
-      <p:nvGrpSpPr>
-        <p:cNvPr id="1" name=""/>
-        <p:cNvGrpSpPr/>
-        <p:nvPr/>
-      </p:nvGrpSpPr>
-      <p:grpSpPr>
-        <a:xfrm>
-          <a:off x="0" y="0"/>
-          <a:ext cx="0" cy="0"/>
-          <a:chOff x="0" y="0"/>
-          <a:chExt cx="0" cy="0"/>
-        </a:xfrm>
-      </p:grpSpPr>
-      <p:sp>
-        <p:nvSpPr>
-          <p:cNvPr id="2" name="Title 1">
-            <a:extLst>
-              <a:ext uri="{FF2B5EF4-FFF2-40B4-BE49-F238E27FC236}">
-                <a16:creationId xmlns:a16="http://schemas.microsoft.com/office/drawing/2014/main" id="{62319947-802E-4CB1-8E44-6EEAC37BE047}"/>
-              </a:ext>
-            </a:extLst>
-          </p:cNvPr>
-          <p:cNvSpPr>
-            <a:spLocks noGrp="1"/>
-          </p:cNvSpPr>
-          <p:nvPr>
-            <p:ph type="title"/>
-          </p:nvPr>
-        </p:nvSpPr>
-        <p:spPr/>
-        <p:txBody>
-          <a:bodyPr/>
-          <a:lstStyle/>
-          <a:p>
-            <a:r>
-              <a:rPr lang="en-US" dirty="0"/>
-              <a:t>Getting Started</a:t>
-            </a:r>
-          </a:p>
-        </p:txBody>
-      </p:sp>
-      <p:sp>
-        <p:nvSpPr>
-          <p:cNvPr id="3" name="Content Placeholder 2">
-            <a:extLst>
-              <a:ext uri="{FF2B5EF4-FFF2-40B4-BE49-F238E27FC236}">
-                <a16:creationId xmlns:a16="http://schemas.microsoft.com/office/drawing/2014/main" id="{940F814C-1647-4465-B18F-ECB9025C5855}"/>
-              </a:ext>
-            </a:extLst>
-          </p:cNvPr>
-          <p:cNvSpPr>
-            <a:spLocks noGrp="1"/>
-          </p:cNvSpPr>
-          <p:nvPr>
-            <p:ph idx="1"/>
-          </p:nvPr>
-        </p:nvSpPr>
-        <p:spPr/>
-        <p:txBody>
-          <a:bodyPr/>
-          <a:lstStyle/>
-          <a:p>
-            <a:r>
-              <a:rPr lang="en-US" dirty="0"/>
-              <a:t>Please update your schedule books now</a:t>
-            </a:r>
-          </a:p>
-          <a:p>
-            <a:r>
-              <a:rPr lang="en-US" dirty="0"/>
-              <a:t>Please start your first day Reflection</a:t>
-            </a:r>
-          </a:p>
-          <a:p>
-            <a:endParaRPr lang="en-US" dirty="0"/>
-          </a:p>
-        </p:txBody>
-      </p:sp>
-    </p:spTree>
-    <p:extLst>
-      <p:ext uri="{BB962C8B-B14F-4D97-AF65-F5344CB8AC3E}">
-        <p14:creationId xmlns:p14="http://schemas.microsoft.com/office/powerpoint/2010/main" val="2401728319"/>
-      </p:ext>
-    </p:extLst>
-  </p:cSld>
-  <p:clrMapOvr>
-    <a:masterClrMapping/>
-  </p:clrMapOvr>
-</p:sld>
-</file>
-
-<file path=ppt/slides/slide19.xml><?xml version="1.0" encoding="utf-8"?>
-<p:sld xmlns:a="http://schemas.openxmlformats.org/drawingml/2006/main" xmlns:r="http://schemas.openxmlformats.org/officeDocument/2006/relationships" xmlns:p="http://schemas.openxmlformats.org/presentationml/2006/main">
-  <p:cSld>
-    <p:bg>
-      <p:bgPr>
-        <a:solidFill>
-          <a:schemeClr val="bg1">
-            <a:tint val="95000"/>
-            <a:satMod val="170000"/>
-          </a:schemeClr>
-        </a:solidFill>
-        <a:effectLst/>
-      </p:bgPr>
-    </p:bg>
-    <p:spTree>
-      <p:nvGrpSpPr>
-        <p:cNvPr id="1" name=""/>
-        <p:cNvGrpSpPr/>
-        <p:nvPr/>
-      </p:nvGrpSpPr>
-      <p:grpSpPr>
-        <a:xfrm>
-          <a:off x="0" y="0"/>
-          <a:ext cx="0" cy="0"/>
-          <a:chOff x="0" y="0"/>
-          <a:chExt cx="0" cy="0"/>
-        </a:xfrm>
-      </p:grpSpPr>
-      <p:sp>
-        <p:nvSpPr>
-          <p:cNvPr id="9" name="Freeform: Shape 8">
-            <a:extLst>
-              <a:ext uri="{FF2B5EF4-FFF2-40B4-BE49-F238E27FC236}">
-                <a16:creationId xmlns:a16="http://schemas.microsoft.com/office/drawing/2014/main" id="{66B332A4-D438-4773-A77F-5ED49A448D9D}"/>
-              </a:ext>
-              <a:ext uri="{C183D7F6-B498-43B3-948B-1728B52AA6E4}">
-                <adec:decorative xmlns:adec="http://schemas.microsoft.com/office/drawing/2017/decorative" val="1"/>
-              </a:ext>
-            </a:extLst>
-          </p:cNvPr>
-          <p:cNvSpPr>
-            <a:spLocks noGrp="1" noRot="1" noChangeAspect="1" noMove="1" noResize="1" noEditPoints="1" noAdjustHandles="1" noChangeArrowheads="1" noChangeShapeType="1" noTextEdit="1"/>
-          </p:cNvSpPr>
-          <p:nvPr>
-            <p:extLst>
-              <p:ext uri="{386F3935-93C4-4BCD-93E2-E3B085C9AB24}">
-                <p16:designElem xmlns:p16="http://schemas.microsoft.com/office/powerpoint/2015/main" val="1"/>
-              </p:ext>
-            </p:extLst>
-          </p:nvPr>
-        </p:nvSpPr>
-        <p:spPr>
-          <a:xfrm>
-            <a:off x="1953768" y="0"/>
-            <a:ext cx="8284464" cy="6858000"/>
-          </a:xfrm>
-          <a:custGeom>
-            <a:avLst/>
-            <a:gdLst>
-              <a:gd name="connsiteX0" fmla="*/ 1818109 w 8284464"/>
-              <a:gd name="connsiteY0" fmla="*/ 0 h 6858000"/>
-              <a:gd name="connsiteX1" fmla="*/ 6466355 w 8284464"/>
-              <a:gd name="connsiteY1" fmla="*/ 0 h 6858000"/>
-              <a:gd name="connsiteX2" fmla="*/ 6620596 w 8284464"/>
-              <a:gd name="connsiteY2" fmla="*/ 109683 h 6858000"/>
-              <a:gd name="connsiteX3" fmla="*/ 8284464 w 8284464"/>
-              <a:gd name="connsiteY3" fmla="*/ 3429000 h 6858000"/>
-              <a:gd name="connsiteX4" fmla="*/ 6620596 w 8284464"/>
-              <a:gd name="connsiteY4" fmla="*/ 6748318 h 6858000"/>
-              <a:gd name="connsiteX5" fmla="*/ 6466355 w 8284464"/>
-              <a:gd name="connsiteY5" fmla="*/ 6858000 h 6858000"/>
-              <a:gd name="connsiteX6" fmla="*/ 1818109 w 8284464"/>
-              <a:gd name="connsiteY6" fmla="*/ 6858000 h 6858000"/>
-              <a:gd name="connsiteX7" fmla="*/ 1663869 w 8284464"/>
-              <a:gd name="connsiteY7" fmla="*/ 6748318 h 6858000"/>
-              <a:gd name="connsiteX8" fmla="*/ 0 w 8284464"/>
-              <a:gd name="connsiteY8" fmla="*/ 3429000 h 6858000"/>
-              <a:gd name="connsiteX9" fmla="*/ 1663869 w 8284464"/>
-              <a:gd name="connsiteY9" fmla="*/ 109683 h 6858000"/>
-            </a:gdLst>
-            <a:ahLst/>
-            <a:cxnLst>
-              <a:cxn ang="0">
-                <a:pos x="connsiteX0" y="connsiteY0"/>
-              </a:cxn>
-              <a:cxn ang="0">
-                <a:pos x="connsiteX1" y="connsiteY1"/>
-              </a:cxn>
-              <a:cxn ang="0">
-                <a:pos x="connsiteX2" y="connsiteY2"/>
-              </a:cxn>
-              <a:cxn ang="0">
-                <a:pos x="connsiteX3" y="connsiteY3"/>
-              </a:cxn>
-              <a:cxn ang="0">
-                <a:pos x="connsiteX4" y="connsiteY4"/>
-              </a:cxn>
-              <a:cxn ang="0">
-                <a:pos x="connsiteX5" y="connsiteY5"/>
-              </a:cxn>
-              <a:cxn ang="0">
-                <a:pos x="connsiteX6" y="connsiteY6"/>
-              </a:cxn>
-              <a:cxn ang="0">
-                <a:pos x="connsiteX7" y="connsiteY7"/>
-              </a:cxn>
-              <a:cxn ang="0">
-                <a:pos x="connsiteX8" y="connsiteY8"/>
-              </a:cxn>
-              <a:cxn ang="0">
-                <a:pos x="connsiteX9" y="connsiteY9"/>
-              </a:cxn>
-            </a:cxnLst>
-            <a:rect l="l" t="t" r="r" b="b"/>
-            <a:pathLst>
-              <a:path w="8284464" h="6858000">
-                <a:moveTo>
-                  <a:pt x="1818109" y="0"/>
-                </a:moveTo>
-                <a:lnTo>
-                  <a:pt x="6466355" y="0"/>
-                </a:lnTo>
-                <a:lnTo>
-                  <a:pt x="6620596" y="109683"/>
-                </a:lnTo>
-                <a:cubicBezTo>
-                  <a:pt x="7630666" y="865069"/>
-                  <a:pt x="8284464" y="2070683"/>
-                  <a:pt x="8284464" y="3429000"/>
-                </a:cubicBezTo>
-                <a:cubicBezTo>
-                  <a:pt x="8284464" y="4787317"/>
-                  <a:pt x="7630666" y="5992931"/>
-                  <a:pt x="6620596" y="6748318"/>
-                </a:cubicBezTo>
-                <a:lnTo>
-                  <a:pt x="6466355" y="6858000"/>
-                </a:lnTo>
-                <a:lnTo>
-                  <a:pt x="1818109" y="6858000"/>
-                </a:lnTo>
-                <a:lnTo>
-                  <a:pt x="1663869" y="6748318"/>
-                </a:lnTo>
-                <a:cubicBezTo>
-                  <a:pt x="653798" y="5992931"/>
-                  <a:pt x="0" y="4787317"/>
-                  <a:pt x="0" y="3429000"/>
-                </a:cubicBezTo>
-                <a:cubicBezTo>
-                  <a:pt x="0" y="2070683"/>
-                  <a:pt x="653798" y="865069"/>
-                  <a:pt x="1663869" y="109683"/>
-                </a:cubicBezTo>
-                <a:close/>
-              </a:path>
-            </a:pathLst>
-          </a:custGeom>
-          <a:solidFill>
-            <a:srgbClr val="FFFFFF">
-              <a:alpha val="80000"/>
-            </a:srgbClr>
-          </a:solidFill>
-          <a:ln>
-            <a:noFill/>
-          </a:ln>
-        </p:spPr>
-        <p:style>
-          <a:lnRef idx="2">
-            <a:schemeClr val="accent1">
-              <a:shade val="50000"/>
-            </a:schemeClr>
-          </a:lnRef>
-          <a:fillRef idx="1">
-            <a:schemeClr val="accent1"/>
-          </a:fillRef>
-          <a:effectRef idx="0">
-            <a:schemeClr val="accent1"/>
-          </a:effectRef>
-          <a:fontRef idx="minor">
-            <a:schemeClr val="lt1"/>
-          </a:fontRef>
-        </p:style>
-        <p:txBody>
-          <a:bodyPr wrap="square" rtlCol="0" anchor="ctr">
-            <a:noAutofit/>
-          </a:bodyPr>
-          <a:lstStyle/>
-          <a:p>
-            <a:pPr algn="ctr"/>
-            <a:endParaRPr lang="en-US"/>
-          </a:p>
-        </p:txBody>
-      </p:sp>
-      <p:sp>
-        <p:nvSpPr>
-          <p:cNvPr id="11" name="Freeform: Shape 10">
-            <a:extLst>
-              <a:ext uri="{FF2B5EF4-FFF2-40B4-BE49-F238E27FC236}">
-                <a16:creationId xmlns:a16="http://schemas.microsoft.com/office/drawing/2014/main" id="{DF9AD32D-FF05-44F4-BD4D-9CEE89B71EB9}"/>
-              </a:ext>
-              <a:ext uri="{C183D7F6-B498-43B3-948B-1728B52AA6E4}">
-                <adec:decorative xmlns:adec="http://schemas.microsoft.com/office/drawing/2017/decorative" val="1"/>
-              </a:ext>
-            </a:extLst>
-          </p:cNvPr>
-          <p:cNvSpPr>
-            <a:spLocks noGrp="1" noRot="1" noChangeAspect="1" noMove="1" noResize="1" noEditPoints="1" noAdjustHandles="1" noChangeArrowheads="1" noChangeShapeType="1" noTextEdit="1"/>
-          </p:cNvSpPr>
-          <p:nvPr>
-            <p:extLst>
-              <p:ext uri="{386F3935-93C4-4BCD-93E2-E3B085C9AB24}">
-                <p16:designElem xmlns:p16="http://schemas.microsoft.com/office/powerpoint/2015/main" val="1"/>
-              </p:ext>
-            </p:extLst>
-          </p:nvPr>
-        </p:nvSpPr>
-        <p:spPr>
-          <a:xfrm>
-            <a:off x="2118360" y="0"/>
-            <a:ext cx="7955280" cy="6858000"/>
-          </a:xfrm>
-          <a:custGeom>
-            <a:avLst/>
-            <a:gdLst>
-              <a:gd name="connsiteX0" fmla="*/ 1962423 w 7955280"/>
-              <a:gd name="connsiteY0" fmla="*/ 0 h 6858000"/>
-              <a:gd name="connsiteX1" fmla="*/ 5992858 w 7955280"/>
-              <a:gd name="connsiteY1" fmla="*/ 0 h 6858000"/>
-              <a:gd name="connsiteX2" fmla="*/ 6040191 w 7955280"/>
-              <a:gd name="connsiteY2" fmla="*/ 27216 h 6858000"/>
-              <a:gd name="connsiteX3" fmla="*/ 7955280 w 7955280"/>
-              <a:gd name="connsiteY3" fmla="*/ 3429000 h 6858000"/>
-              <a:gd name="connsiteX4" fmla="*/ 6040191 w 7955280"/>
-              <a:gd name="connsiteY4" fmla="*/ 6830784 h 6858000"/>
-              <a:gd name="connsiteX5" fmla="*/ 5992858 w 7955280"/>
-              <a:gd name="connsiteY5" fmla="*/ 6858000 h 6858000"/>
-              <a:gd name="connsiteX6" fmla="*/ 1962423 w 7955280"/>
-              <a:gd name="connsiteY6" fmla="*/ 6858000 h 6858000"/>
-              <a:gd name="connsiteX7" fmla="*/ 1915089 w 7955280"/>
-              <a:gd name="connsiteY7" fmla="*/ 6830784 h 6858000"/>
-              <a:gd name="connsiteX8" fmla="*/ 0 w 7955280"/>
-              <a:gd name="connsiteY8" fmla="*/ 3429000 h 6858000"/>
-              <a:gd name="connsiteX9" fmla="*/ 1915089 w 7955280"/>
-              <a:gd name="connsiteY9" fmla="*/ 27216 h 6858000"/>
-            </a:gdLst>
-            <a:ahLst/>
-            <a:cxnLst>
-              <a:cxn ang="0">
-                <a:pos x="connsiteX0" y="connsiteY0"/>
-              </a:cxn>
-              <a:cxn ang="0">
-                <a:pos x="connsiteX1" y="connsiteY1"/>
-              </a:cxn>
-              <a:cxn ang="0">
-                <a:pos x="connsiteX2" y="connsiteY2"/>
-              </a:cxn>
-              <a:cxn ang="0">
-                <a:pos x="connsiteX3" y="connsiteY3"/>
-              </a:cxn>
-              <a:cxn ang="0">
-                <a:pos x="connsiteX4" y="connsiteY4"/>
-              </a:cxn>
-              <a:cxn ang="0">
-                <a:pos x="connsiteX5" y="connsiteY5"/>
-              </a:cxn>
-              <a:cxn ang="0">
-                <a:pos x="connsiteX6" y="connsiteY6"/>
-              </a:cxn>
-              <a:cxn ang="0">
-                <a:pos x="connsiteX7" y="connsiteY7"/>
-              </a:cxn>
-              <a:cxn ang="0">
-                <a:pos x="connsiteX8" y="connsiteY8"/>
-              </a:cxn>
-              <a:cxn ang="0">
-                <a:pos x="connsiteX9" y="connsiteY9"/>
-              </a:cxn>
-            </a:cxnLst>
-            <a:rect l="l" t="t" r="r" b="b"/>
-            <a:pathLst>
-              <a:path w="7955280" h="6858000">
-                <a:moveTo>
-                  <a:pt x="1962423" y="0"/>
-                </a:moveTo>
-                <a:lnTo>
-                  <a:pt x="5992858" y="0"/>
-                </a:lnTo>
-                <a:lnTo>
-                  <a:pt x="6040191" y="27216"/>
-                </a:lnTo>
-                <a:cubicBezTo>
-                  <a:pt x="7188332" y="724844"/>
-                  <a:pt x="7955280" y="1987357"/>
-                  <a:pt x="7955280" y="3429000"/>
-                </a:cubicBezTo>
-                <a:cubicBezTo>
-                  <a:pt x="7955280" y="4870644"/>
-                  <a:pt x="7188332" y="6133157"/>
-                  <a:pt x="6040191" y="6830784"/>
-                </a:cubicBezTo>
-                <a:lnTo>
-                  <a:pt x="5992858" y="6858000"/>
-                </a:lnTo>
-                <a:lnTo>
-                  <a:pt x="1962423" y="6858000"/>
-                </a:lnTo>
-                <a:lnTo>
-                  <a:pt x="1915089" y="6830784"/>
-                </a:lnTo>
-                <a:cubicBezTo>
-                  <a:pt x="766948" y="6133157"/>
-                  <a:pt x="0" y="4870644"/>
-                  <a:pt x="0" y="3429000"/>
-                </a:cubicBezTo>
-                <a:cubicBezTo>
-                  <a:pt x="0" y="1987357"/>
-                  <a:pt x="766948" y="724844"/>
-                  <a:pt x="1915089" y="27216"/>
-                </a:cubicBezTo>
-                <a:close/>
-              </a:path>
-            </a:pathLst>
-          </a:custGeom>
-          <a:solidFill>
-            <a:schemeClr val="tx1"/>
-          </a:solidFill>
-          <a:ln>
-            <a:noFill/>
-          </a:ln>
-        </p:spPr>
-        <p:style>
-          <a:lnRef idx="2">
-            <a:schemeClr val="accent1">
-              <a:shade val="50000"/>
-            </a:schemeClr>
-          </a:lnRef>
-          <a:fillRef idx="1">
-            <a:schemeClr val="accent1"/>
-          </a:fillRef>
-          <a:effectRef idx="0">
-            <a:schemeClr val="accent1"/>
-          </a:effectRef>
-          <a:fontRef idx="minor">
-            <a:schemeClr val="lt1"/>
-          </a:fontRef>
-        </p:style>
-        <p:txBody>
-          <a:bodyPr wrap="square" rtlCol="0" anchor="ctr">
-            <a:noAutofit/>
-          </a:bodyPr>
-          <a:lstStyle/>
-          <a:p>
-            <a:pPr algn="ctr"/>
-            <a:endParaRPr lang="en-US"/>
-          </a:p>
-        </p:txBody>
-      </p:sp>
-      <p:sp>
-        <p:nvSpPr>
-          <p:cNvPr id="4" name="Title 3">
-            <a:extLst>
-              <a:ext uri="{FF2B5EF4-FFF2-40B4-BE49-F238E27FC236}">
-                <a16:creationId xmlns:a16="http://schemas.microsoft.com/office/drawing/2014/main" id="{485F5261-2466-422E-8729-DD95ECBB1F09}"/>
-              </a:ext>
-            </a:extLst>
-          </p:cNvPr>
-          <p:cNvSpPr>
-            <a:spLocks noGrp="1"/>
-          </p:cNvSpPr>
-          <p:nvPr>
-            <p:ph type="title"/>
-          </p:nvPr>
-        </p:nvSpPr>
-        <p:spPr>
-          <a:xfrm>
-            <a:off x="2555631" y="1441938"/>
-            <a:ext cx="7080738" cy="3974124"/>
-          </a:xfrm>
-        </p:spPr>
-        <p:txBody>
-          <a:bodyPr>
-            <a:normAutofit/>
-          </a:bodyPr>
-          <a:lstStyle/>
-          <a:p>
-            <a:pPr algn="ctr"/>
-            <a:r>
-              <a:rPr lang="en-US" sz="5400" dirty="0">
-                <a:solidFill>
-                  <a:schemeClr val="bg1">
-                    <a:lumMod val="95000"/>
-                    <a:lumOff val="5000"/>
-                  </a:schemeClr>
-                </a:solidFill>
-              </a:rPr>
-              <a:t>The End</a:t>
-            </a:r>
-          </a:p>
-        </p:txBody>
-      </p:sp>
-    </p:spTree>
-    <p:extLst>
-      <p:ext uri="{BB962C8B-B14F-4D97-AF65-F5344CB8AC3E}">
-        <p14:creationId xmlns:p14="http://schemas.microsoft.com/office/powerpoint/2010/main" val="1479035090"/>
-      </p:ext>
-    </p:extLst>
-  </p:cSld>
-  <p:clrMapOvr>
-    <a:overrideClrMapping bg1="dk1" tx1="lt1" bg2="dk2" tx2="lt2" accent1="accent1" accent2="accent2" accent3="accent3" accent4="accent4" accent5="accent5" accent6="accent6" hlink="hlink" folHlink="folHlink"/>
-  </p:clrMapOvr>
   <p:timing>
     <p:tnLst>
       <p:par>
@@ -5459,9 +4234,6 @@
                     <p:cTn id="3" fill="hold">
                       <p:stCondLst>
                         <p:cond delay="indefinite"/>
-                        <p:cond evt="onBegin" delay="0">
-                          <p:tn val="2"/>
-                        </p:cond>
                       </p:stCondLst>
                       <p:childTnLst>
                         <p:par>
@@ -5471,13 +4243,10 @@
                             </p:stCondLst>
                             <p:childTnLst>
                               <p:par>
-                                <p:cTn id="5" presetID="10" presetClass="entr" presetSubtype="0" fill="hold" grpId="0" nodeType="withEffect">
+                                <p:cTn id="5" presetID="1" presetClass="entr" presetSubtype="0" fill="hold" grpId="0" nodeType="clickEffect">
                                   <p:stCondLst>
-                                    <p:cond delay="500"/>
+                                    <p:cond delay="0"/>
                                   </p:stCondLst>
-                                  <p:iterate>
-                                    <p:tmPct val="10000"/>
-                                  </p:iterate>
                                   <p:childTnLst>
                                     <p:set>
                                       <p:cBhvr>
@@ -5487,7 +4256,11 @@
                                           </p:stCondLst>
                                         </p:cTn>
                                         <p:tgtEl>
-                                          <p:spTgt spid="4"/>
+                                          <p:spTgt spid="4">
+                                            <p:txEl>
+                                              <p:pRg st="0" end="0"/>
+                                            </p:txEl>
+                                          </p:spTgt>
                                         </p:tgtEl>
                                         <p:attrNameLst>
                                           <p:attrName>style.visibility</p:attrName>
@@ -5497,14 +4270,259 @@
                                         <p:strVal val="visible"/>
                                       </p:to>
                                     </p:set>
-                                    <p:animEffect transition="in" filter="fade">
+                                  </p:childTnLst>
+                                </p:cTn>
+                              </p:par>
+                              <p:par>
+                                <p:cTn id="7" presetID="1" presetClass="entr" presetSubtype="0" fill="hold" grpId="0" nodeType="withEffect">
+                                  <p:stCondLst>
+                                    <p:cond delay="0"/>
+                                  </p:stCondLst>
+                                  <p:childTnLst>
+                                    <p:set>
                                       <p:cBhvr>
-                                        <p:cTn id="7" dur="700"/>
+                                        <p:cTn id="8" dur="1" fill="hold">
+                                          <p:stCondLst>
+                                            <p:cond delay="0"/>
+                                          </p:stCondLst>
+                                        </p:cTn>
                                         <p:tgtEl>
-                                          <p:spTgt spid="4"/>
+                                          <p:spTgt spid="4">
+                                            <p:txEl>
+                                              <p:pRg st="1" end="1"/>
+                                            </p:txEl>
+                                          </p:spTgt>
                                         </p:tgtEl>
+                                        <p:attrNameLst>
+                                          <p:attrName>style.visibility</p:attrName>
+                                        </p:attrNameLst>
                                       </p:cBhvr>
-                                    </p:animEffect>
+                                      <p:to>
+                                        <p:strVal val="visible"/>
+                                      </p:to>
+                                    </p:set>
+                                  </p:childTnLst>
+                                </p:cTn>
+                              </p:par>
+                            </p:childTnLst>
+                          </p:cTn>
+                        </p:par>
+                      </p:childTnLst>
+                    </p:cTn>
+                  </p:par>
+                  <p:par>
+                    <p:cTn id="9" fill="hold">
+                      <p:stCondLst>
+                        <p:cond delay="indefinite"/>
+                      </p:stCondLst>
+                      <p:childTnLst>
+                        <p:par>
+                          <p:cTn id="10" fill="hold">
+                            <p:stCondLst>
+                              <p:cond delay="0"/>
+                            </p:stCondLst>
+                            <p:childTnLst>
+                              <p:par>
+                                <p:cTn id="11" presetID="1" presetClass="entr" presetSubtype="0" fill="hold" grpId="0" nodeType="clickEffect">
+                                  <p:stCondLst>
+                                    <p:cond delay="0"/>
+                                  </p:stCondLst>
+                                  <p:childTnLst>
+                                    <p:set>
+                                      <p:cBhvr>
+                                        <p:cTn id="12" dur="1" fill="hold">
+                                          <p:stCondLst>
+                                            <p:cond delay="0"/>
+                                          </p:stCondLst>
+                                        </p:cTn>
+                                        <p:tgtEl>
+                                          <p:spTgt spid="4">
+                                            <p:txEl>
+                                              <p:pRg st="2" end="2"/>
+                                            </p:txEl>
+                                          </p:spTgt>
+                                        </p:tgtEl>
+                                        <p:attrNameLst>
+                                          <p:attrName>style.visibility</p:attrName>
+                                        </p:attrNameLst>
+                                      </p:cBhvr>
+                                      <p:to>
+                                        <p:strVal val="visible"/>
+                                      </p:to>
+                                    </p:set>
+                                  </p:childTnLst>
+                                </p:cTn>
+                              </p:par>
+                              <p:par>
+                                <p:cTn id="13" presetID="1" presetClass="entr" presetSubtype="0" fill="hold" grpId="0" nodeType="withEffect">
+                                  <p:stCondLst>
+                                    <p:cond delay="0"/>
+                                  </p:stCondLst>
+                                  <p:childTnLst>
+                                    <p:set>
+                                      <p:cBhvr>
+                                        <p:cTn id="14" dur="1" fill="hold">
+                                          <p:stCondLst>
+                                            <p:cond delay="0"/>
+                                          </p:stCondLst>
+                                        </p:cTn>
+                                        <p:tgtEl>
+                                          <p:spTgt spid="4">
+                                            <p:txEl>
+                                              <p:pRg st="3" end="3"/>
+                                            </p:txEl>
+                                          </p:spTgt>
+                                        </p:tgtEl>
+                                        <p:attrNameLst>
+                                          <p:attrName>style.visibility</p:attrName>
+                                        </p:attrNameLst>
+                                      </p:cBhvr>
+                                      <p:to>
+                                        <p:strVal val="visible"/>
+                                      </p:to>
+                                    </p:set>
+                                  </p:childTnLst>
+                                </p:cTn>
+                              </p:par>
+                              <p:par>
+                                <p:cTn id="15" presetID="1" presetClass="entr" presetSubtype="0" fill="hold" grpId="0" nodeType="withEffect">
+                                  <p:stCondLst>
+                                    <p:cond delay="0"/>
+                                  </p:stCondLst>
+                                  <p:childTnLst>
+                                    <p:set>
+                                      <p:cBhvr>
+                                        <p:cTn id="16" dur="1" fill="hold">
+                                          <p:stCondLst>
+                                            <p:cond delay="0"/>
+                                          </p:stCondLst>
+                                        </p:cTn>
+                                        <p:tgtEl>
+                                          <p:spTgt spid="4">
+                                            <p:txEl>
+                                              <p:pRg st="4" end="4"/>
+                                            </p:txEl>
+                                          </p:spTgt>
+                                        </p:tgtEl>
+                                        <p:attrNameLst>
+                                          <p:attrName>style.visibility</p:attrName>
+                                        </p:attrNameLst>
+                                      </p:cBhvr>
+                                      <p:to>
+                                        <p:strVal val="visible"/>
+                                      </p:to>
+                                    </p:set>
+                                  </p:childTnLst>
+                                </p:cTn>
+                              </p:par>
+                              <p:par>
+                                <p:cTn id="17" presetID="1" presetClass="entr" presetSubtype="0" fill="hold" grpId="0" nodeType="withEffect">
+                                  <p:stCondLst>
+                                    <p:cond delay="0"/>
+                                  </p:stCondLst>
+                                  <p:childTnLst>
+                                    <p:set>
+                                      <p:cBhvr>
+                                        <p:cTn id="18" dur="1" fill="hold">
+                                          <p:stCondLst>
+                                            <p:cond delay="0"/>
+                                          </p:stCondLst>
+                                        </p:cTn>
+                                        <p:tgtEl>
+                                          <p:spTgt spid="4">
+                                            <p:txEl>
+                                              <p:pRg st="5" end="5"/>
+                                            </p:txEl>
+                                          </p:spTgt>
+                                        </p:tgtEl>
+                                        <p:attrNameLst>
+                                          <p:attrName>style.visibility</p:attrName>
+                                        </p:attrNameLst>
+                                      </p:cBhvr>
+                                      <p:to>
+                                        <p:strVal val="visible"/>
+                                      </p:to>
+                                    </p:set>
+                                  </p:childTnLst>
+                                </p:cTn>
+                              </p:par>
+                              <p:par>
+                                <p:cTn id="19" presetID="1" presetClass="entr" presetSubtype="0" fill="hold" grpId="0" nodeType="withEffect">
+                                  <p:stCondLst>
+                                    <p:cond delay="0"/>
+                                  </p:stCondLst>
+                                  <p:childTnLst>
+                                    <p:set>
+                                      <p:cBhvr>
+                                        <p:cTn id="20" dur="1" fill="hold">
+                                          <p:stCondLst>
+                                            <p:cond delay="0"/>
+                                          </p:stCondLst>
+                                        </p:cTn>
+                                        <p:tgtEl>
+                                          <p:spTgt spid="4">
+                                            <p:txEl>
+                                              <p:pRg st="6" end="6"/>
+                                            </p:txEl>
+                                          </p:spTgt>
+                                        </p:tgtEl>
+                                        <p:attrNameLst>
+                                          <p:attrName>style.visibility</p:attrName>
+                                        </p:attrNameLst>
+                                      </p:cBhvr>
+                                      <p:to>
+                                        <p:strVal val="visible"/>
+                                      </p:to>
+                                    </p:set>
+                                  </p:childTnLst>
+                                </p:cTn>
+                              </p:par>
+                            </p:childTnLst>
+                          </p:cTn>
+                        </p:par>
+                      </p:childTnLst>
+                    </p:cTn>
+                  </p:par>
+                  <p:par>
+                    <p:cTn id="21" fill="hold">
+                      <p:stCondLst>
+                        <p:cond delay="indefinite"/>
+                      </p:stCondLst>
+                      <p:childTnLst>
+                        <p:par>
+                          <p:cTn id="22" fill="hold">
+                            <p:stCondLst>
+                              <p:cond delay="0"/>
+                            </p:stCondLst>
+                            <p:childTnLst>
+                              <p:par>
+                                <p:cTn id="23" presetID="1" presetClass="entr" presetSubtype="0" fill="hold" grpId="0" nodeType="clickEffect">
+                                  <p:stCondLst>
+                                    <p:cond delay="0"/>
+                                  </p:stCondLst>
+                                  <p:childTnLst>
+                                    <p:set>
+                                      <p:cBhvr>
+                                        <p:cTn id="24" dur="1" fill="hold">
+                                          <p:stCondLst>
+                                            <p:cond delay="0"/>
+                                          </p:stCondLst>
+                                        </p:cTn>
+                                        <p:tgtEl>
+                                          <p:spTgt spid="4">
+                                            <p:txEl>
+                                              <p:pRg st="7" end="7"/>
+                                            </p:txEl>
+                                          </p:spTgt>
+                                        </p:tgtEl>
+                                        <p:attrNameLst>
+                                          <p:attrName>style.visibility</p:attrName>
+                                        </p:attrNameLst>
+                                      </p:cBhvr>
+                                      <p:to>
+                                        <p:strVal val="visible"/>
+                                      </p:to>
+                                    </p:set>
                                   </p:childTnLst>
                                 </p:cTn>
                               </p:par>
@@ -5536,9 +4554,756 @@
       </p:par>
     </p:tnLst>
     <p:bldLst>
-      <p:bldP spid="4" grpId="0"/>
+      <p:bldP spid="4" grpId="0" build="p"/>
     </p:bldLst>
   </p:timing>
+</p:sld>
+</file>
+
+<file path=ppt/slides/slide17.xml><?xml version="1.0" encoding="utf-8"?>
+<p:sld xmlns:a="http://schemas.openxmlformats.org/drawingml/2006/main" xmlns:r="http://schemas.openxmlformats.org/officeDocument/2006/relationships" xmlns:p="http://schemas.openxmlformats.org/presentationml/2006/main">
+  <p:cSld>
+    <p:spTree>
+      <p:nvGrpSpPr>
+        <p:cNvPr id="1" name=""/>
+        <p:cNvGrpSpPr/>
+        <p:nvPr/>
+      </p:nvGrpSpPr>
+      <p:grpSpPr>
+        <a:xfrm>
+          <a:off x="0" y="0"/>
+          <a:ext cx="0" cy="0"/>
+          <a:chOff x="0" y="0"/>
+          <a:chExt cx="0" cy="0"/>
+        </a:xfrm>
+      </p:grpSpPr>
+      <p:sp>
+        <p:nvSpPr>
+          <p:cNvPr id="2" name="Title 1">
+            <a:extLst>
+              <a:ext uri="{FF2B5EF4-FFF2-40B4-BE49-F238E27FC236}">
+                <a16:creationId xmlns:a16="http://schemas.microsoft.com/office/drawing/2014/main" id="{502E689F-A515-4767-BD41-8CB110C768E9}"/>
+              </a:ext>
+            </a:extLst>
+          </p:cNvPr>
+          <p:cNvSpPr>
+            <a:spLocks noGrp="1"/>
+          </p:cNvSpPr>
+          <p:nvPr>
+            <p:ph type="title"/>
+          </p:nvPr>
+        </p:nvSpPr>
+        <p:spPr/>
+        <p:txBody>
+          <a:bodyPr/>
+          <a:lstStyle/>
+          <a:p>
+            <a:r>
+              <a:rPr lang="en-US" dirty="0"/>
+              <a:t>This week:</a:t>
+            </a:r>
+          </a:p>
+        </p:txBody>
+      </p:sp>
+      <p:sp>
+        <p:nvSpPr>
+          <p:cNvPr id="3" name="Content Placeholder 2">
+            <a:extLst>
+              <a:ext uri="{FF2B5EF4-FFF2-40B4-BE49-F238E27FC236}">
+                <a16:creationId xmlns:a16="http://schemas.microsoft.com/office/drawing/2014/main" id="{EA61E9FC-5184-4B34-BC57-79ADFA9BFA3E}"/>
+              </a:ext>
+            </a:extLst>
+          </p:cNvPr>
+          <p:cNvSpPr>
+            <a:spLocks noGrp="1"/>
+          </p:cNvSpPr>
+          <p:nvPr>
+            <p:ph idx="1"/>
+          </p:nvPr>
+        </p:nvSpPr>
+        <p:spPr/>
+        <p:txBody>
+          <a:bodyPr/>
+          <a:lstStyle/>
+          <a:p>
+            <a:r>
+              <a:rPr lang="en-US" dirty="0"/>
+              <a:t>There are now Reflections for the beginning AND end of week</a:t>
+            </a:r>
+          </a:p>
+          <a:p>
+            <a:r>
+              <a:rPr lang="en-US" dirty="0"/>
+              <a:t>We are upgrading our Flashcards to use objects and add performance-related questions</a:t>
+            </a:r>
+          </a:p>
+          <a:p>
+            <a:r>
+              <a:rPr lang="en-US" dirty="0"/>
+              <a:t>Lesson on using professional language to your advantage</a:t>
+            </a:r>
+          </a:p>
+          <a:p>
+            <a:r>
+              <a:rPr lang="en-US" dirty="0"/>
+              <a:t>Mr. Shaw for scheduling at 10:20am on Thursday</a:t>
+            </a:r>
+          </a:p>
+          <a:p>
+            <a:r>
+              <a:rPr lang="en-US" dirty="0"/>
+              <a:t>No school this Friday</a:t>
+            </a:r>
+          </a:p>
+          <a:p>
+            <a:pPr lvl="1"/>
+            <a:r>
+              <a:rPr lang="en-US" dirty="0"/>
+              <a:t>No “Free Friday”, even with 50 </a:t>
+            </a:r>
+            <a:r>
+              <a:rPr lang="en-US" dirty="0" err="1"/>
+              <a:t>pogs</a:t>
+            </a:r>
+            <a:endParaRPr lang="en-US" dirty="0"/>
+          </a:p>
+        </p:txBody>
+      </p:sp>
+    </p:spTree>
+    <p:extLst>
+      <p:ext uri="{BB962C8B-B14F-4D97-AF65-F5344CB8AC3E}">
+        <p14:creationId xmlns:p14="http://schemas.microsoft.com/office/powerpoint/2010/main" val="1321469266"/>
+      </p:ext>
+    </p:extLst>
+  </p:cSld>
+  <p:clrMapOvr>
+    <a:masterClrMapping/>
+  </p:clrMapOvr>
+  <p:timing>
+    <p:tnLst>
+      <p:par>
+        <p:cTn id="1" dur="indefinite" restart="never" nodeType="tmRoot">
+          <p:childTnLst>
+            <p:seq concurrent="1" nextAc="seek">
+              <p:cTn id="2" dur="indefinite" nodeType="mainSeq">
+                <p:childTnLst>
+                  <p:par>
+                    <p:cTn id="3" fill="hold">
+                      <p:stCondLst>
+                        <p:cond delay="indefinite"/>
+                      </p:stCondLst>
+                      <p:childTnLst>
+                        <p:par>
+                          <p:cTn id="4" fill="hold">
+                            <p:stCondLst>
+                              <p:cond delay="0"/>
+                            </p:stCondLst>
+                            <p:childTnLst>
+                              <p:par>
+                                <p:cTn id="5" presetID="1" presetClass="entr" presetSubtype="0" fill="hold" grpId="0" nodeType="clickEffect">
+                                  <p:stCondLst>
+                                    <p:cond delay="0"/>
+                                  </p:stCondLst>
+                                  <p:childTnLst>
+                                    <p:set>
+                                      <p:cBhvr>
+                                        <p:cTn id="6" dur="1" fill="hold">
+                                          <p:stCondLst>
+                                            <p:cond delay="0"/>
+                                          </p:stCondLst>
+                                        </p:cTn>
+                                        <p:tgtEl>
+                                          <p:spTgt spid="3">
+                                            <p:txEl>
+                                              <p:pRg st="0" end="0"/>
+                                            </p:txEl>
+                                          </p:spTgt>
+                                        </p:tgtEl>
+                                        <p:attrNameLst>
+                                          <p:attrName>style.visibility</p:attrName>
+                                        </p:attrNameLst>
+                                      </p:cBhvr>
+                                      <p:to>
+                                        <p:strVal val="visible"/>
+                                      </p:to>
+                                    </p:set>
+                                  </p:childTnLst>
+                                </p:cTn>
+                              </p:par>
+                            </p:childTnLst>
+                          </p:cTn>
+                        </p:par>
+                      </p:childTnLst>
+                    </p:cTn>
+                  </p:par>
+                  <p:par>
+                    <p:cTn id="7" fill="hold">
+                      <p:stCondLst>
+                        <p:cond delay="indefinite"/>
+                      </p:stCondLst>
+                      <p:childTnLst>
+                        <p:par>
+                          <p:cTn id="8" fill="hold">
+                            <p:stCondLst>
+                              <p:cond delay="0"/>
+                            </p:stCondLst>
+                            <p:childTnLst>
+                              <p:par>
+                                <p:cTn id="9" presetID="1" presetClass="entr" presetSubtype="0" fill="hold" grpId="0" nodeType="clickEffect">
+                                  <p:stCondLst>
+                                    <p:cond delay="0"/>
+                                  </p:stCondLst>
+                                  <p:childTnLst>
+                                    <p:set>
+                                      <p:cBhvr>
+                                        <p:cTn id="10" dur="1" fill="hold">
+                                          <p:stCondLst>
+                                            <p:cond delay="0"/>
+                                          </p:stCondLst>
+                                        </p:cTn>
+                                        <p:tgtEl>
+                                          <p:spTgt spid="3">
+                                            <p:txEl>
+                                              <p:pRg st="1" end="1"/>
+                                            </p:txEl>
+                                          </p:spTgt>
+                                        </p:tgtEl>
+                                        <p:attrNameLst>
+                                          <p:attrName>style.visibility</p:attrName>
+                                        </p:attrNameLst>
+                                      </p:cBhvr>
+                                      <p:to>
+                                        <p:strVal val="visible"/>
+                                      </p:to>
+                                    </p:set>
+                                  </p:childTnLst>
+                                </p:cTn>
+                              </p:par>
+                            </p:childTnLst>
+                          </p:cTn>
+                        </p:par>
+                      </p:childTnLst>
+                    </p:cTn>
+                  </p:par>
+                  <p:par>
+                    <p:cTn id="11" fill="hold">
+                      <p:stCondLst>
+                        <p:cond delay="indefinite"/>
+                      </p:stCondLst>
+                      <p:childTnLst>
+                        <p:par>
+                          <p:cTn id="12" fill="hold">
+                            <p:stCondLst>
+                              <p:cond delay="0"/>
+                            </p:stCondLst>
+                            <p:childTnLst>
+                              <p:par>
+                                <p:cTn id="13" presetID="1" presetClass="entr" presetSubtype="0" fill="hold" grpId="0" nodeType="clickEffect">
+                                  <p:stCondLst>
+                                    <p:cond delay="0"/>
+                                  </p:stCondLst>
+                                  <p:childTnLst>
+                                    <p:set>
+                                      <p:cBhvr>
+                                        <p:cTn id="14" dur="1" fill="hold">
+                                          <p:stCondLst>
+                                            <p:cond delay="0"/>
+                                          </p:stCondLst>
+                                        </p:cTn>
+                                        <p:tgtEl>
+                                          <p:spTgt spid="3">
+                                            <p:txEl>
+                                              <p:pRg st="2" end="2"/>
+                                            </p:txEl>
+                                          </p:spTgt>
+                                        </p:tgtEl>
+                                        <p:attrNameLst>
+                                          <p:attrName>style.visibility</p:attrName>
+                                        </p:attrNameLst>
+                                      </p:cBhvr>
+                                      <p:to>
+                                        <p:strVal val="visible"/>
+                                      </p:to>
+                                    </p:set>
+                                  </p:childTnLst>
+                                </p:cTn>
+                              </p:par>
+                            </p:childTnLst>
+                          </p:cTn>
+                        </p:par>
+                      </p:childTnLst>
+                    </p:cTn>
+                  </p:par>
+                  <p:par>
+                    <p:cTn id="15" fill="hold">
+                      <p:stCondLst>
+                        <p:cond delay="indefinite"/>
+                      </p:stCondLst>
+                      <p:childTnLst>
+                        <p:par>
+                          <p:cTn id="16" fill="hold">
+                            <p:stCondLst>
+                              <p:cond delay="0"/>
+                            </p:stCondLst>
+                            <p:childTnLst>
+                              <p:par>
+                                <p:cTn id="17" presetID="1" presetClass="entr" presetSubtype="0" fill="hold" grpId="0" nodeType="clickEffect">
+                                  <p:stCondLst>
+                                    <p:cond delay="0"/>
+                                  </p:stCondLst>
+                                  <p:childTnLst>
+                                    <p:set>
+                                      <p:cBhvr>
+                                        <p:cTn id="18" dur="1" fill="hold">
+                                          <p:stCondLst>
+                                            <p:cond delay="0"/>
+                                          </p:stCondLst>
+                                        </p:cTn>
+                                        <p:tgtEl>
+                                          <p:spTgt spid="3">
+                                            <p:txEl>
+                                              <p:pRg st="3" end="3"/>
+                                            </p:txEl>
+                                          </p:spTgt>
+                                        </p:tgtEl>
+                                        <p:attrNameLst>
+                                          <p:attrName>style.visibility</p:attrName>
+                                        </p:attrNameLst>
+                                      </p:cBhvr>
+                                      <p:to>
+                                        <p:strVal val="visible"/>
+                                      </p:to>
+                                    </p:set>
+                                  </p:childTnLst>
+                                </p:cTn>
+                              </p:par>
+                            </p:childTnLst>
+                          </p:cTn>
+                        </p:par>
+                      </p:childTnLst>
+                    </p:cTn>
+                  </p:par>
+                  <p:par>
+                    <p:cTn id="19" fill="hold">
+                      <p:stCondLst>
+                        <p:cond delay="indefinite"/>
+                      </p:stCondLst>
+                      <p:childTnLst>
+                        <p:par>
+                          <p:cTn id="20" fill="hold">
+                            <p:stCondLst>
+                              <p:cond delay="0"/>
+                            </p:stCondLst>
+                            <p:childTnLst>
+                              <p:par>
+                                <p:cTn id="21" presetID="1" presetClass="entr" presetSubtype="0" fill="hold" grpId="0" nodeType="clickEffect">
+                                  <p:stCondLst>
+                                    <p:cond delay="0"/>
+                                  </p:stCondLst>
+                                  <p:childTnLst>
+                                    <p:set>
+                                      <p:cBhvr>
+                                        <p:cTn id="22" dur="1" fill="hold">
+                                          <p:stCondLst>
+                                            <p:cond delay="0"/>
+                                          </p:stCondLst>
+                                        </p:cTn>
+                                        <p:tgtEl>
+                                          <p:spTgt spid="3">
+                                            <p:txEl>
+                                              <p:pRg st="4" end="4"/>
+                                            </p:txEl>
+                                          </p:spTgt>
+                                        </p:tgtEl>
+                                        <p:attrNameLst>
+                                          <p:attrName>style.visibility</p:attrName>
+                                        </p:attrNameLst>
+                                      </p:cBhvr>
+                                      <p:to>
+                                        <p:strVal val="visible"/>
+                                      </p:to>
+                                    </p:set>
+                                  </p:childTnLst>
+                                </p:cTn>
+                              </p:par>
+                              <p:par>
+                                <p:cTn id="23" presetID="1" presetClass="entr" presetSubtype="0" fill="hold" grpId="0" nodeType="withEffect">
+                                  <p:stCondLst>
+                                    <p:cond delay="0"/>
+                                  </p:stCondLst>
+                                  <p:childTnLst>
+                                    <p:set>
+                                      <p:cBhvr>
+                                        <p:cTn id="24" dur="1" fill="hold">
+                                          <p:stCondLst>
+                                            <p:cond delay="0"/>
+                                          </p:stCondLst>
+                                        </p:cTn>
+                                        <p:tgtEl>
+                                          <p:spTgt spid="3">
+                                            <p:txEl>
+                                              <p:pRg st="5" end="5"/>
+                                            </p:txEl>
+                                          </p:spTgt>
+                                        </p:tgtEl>
+                                        <p:attrNameLst>
+                                          <p:attrName>style.visibility</p:attrName>
+                                        </p:attrNameLst>
+                                      </p:cBhvr>
+                                      <p:to>
+                                        <p:strVal val="visible"/>
+                                      </p:to>
+                                    </p:set>
+                                  </p:childTnLst>
+                                </p:cTn>
+                              </p:par>
+                            </p:childTnLst>
+                          </p:cTn>
+                        </p:par>
+                      </p:childTnLst>
+                    </p:cTn>
+                  </p:par>
+                </p:childTnLst>
+              </p:cTn>
+              <p:prevCondLst>
+                <p:cond evt="onPrev" delay="0">
+                  <p:tgtEl>
+                    <p:sldTgt/>
+                  </p:tgtEl>
+                </p:cond>
+              </p:prevCondLst>
+              <p:nextCondLst>
+                <p:cond evt="onNext" delay="0">
+                  <p:tgtEl>
+                    <p:sldTgt/>
+                  </p:tgtEl>
+                </p:cond>
+              </p:nextCondLst>
+            </p:seq>
+          </p:childTnLst>
+        </p:cTn>
+      </p:par>
+    </p:tnLst>
+    <p:bldLst>
+      <p:bldP spid="3" grpId="0" build="p"/>
+    </p:bldLst>
+  </p:timing>
+</p:sld>
+</file>
+
+<file path=ppt/slides/slide18.xml><?xml version="1.0" encoding="utf-8"?>
+<p:sld xmlns:a="http://schemas.openxmlformats.org/drawingml/2006/main" xmlns:r="http://schemas.openxmlformats.org/officeDocument/2006/relationships" xmlns:p="http://schemas.openxmlformats.org/presentationml/2006/main">
+  <p:cSld>
+    <p:spTree>
+      <p:nvGrpSpPr>
+        <p:cNvPr id="1" name=""/>
+        <p:cNvGrpSpPr/>
+        <p:nvPr/>
+      </p:nvGrpSpPr>
+      <p:grpSpPr>
+        <a:xfrm>
+          <a:off x="0" y="0"/>
+          <a:ext cx="0" cy="0"/>
+          <a:chOff x="0" y="0"/>
+          <a:chExt cx="0" cy="0"/>
+        </a:xfrm>
+      </p:grpSpPr>
+      <p:sp>
+        <p:nvSpPr>
+          <p:cNvPr id="2" name="Title 1">
+            <a:extLst>
+              <a:ext uri="{FF2B5EF4-FFF2-40B4-BE49-F238E27FC236}">
+                <a16:creationId xmlns:a16="http://schemas.microsoft.com/office/drawing/2014/main" id="{38261810-B9E8-4819-B46D-387132E471DC}"/>
+              </a:ext>
+            </a:extLst>
+          </p:cNvPr>
+          <p:cNvSpPr>
+            <a:spLocks noGrp="1"/>
+          </p:cNvSpPr>
+          <p:nvPr>
+            <p:ph type="title"/>
+          </p:nvPr>
+        </p:nvSpPr>
+        <p:spPr/>
+        <p:txBody>
+          <a:bodyPr/>
+          <a:lstStyle/>
+          <a:p>
+            <a:r>
+              <a:rPr lang="en-US" dirty="0"/>
+              <a:t>Dog pants</a:t>
+            </a:r>
+          </a:p>
+        </p:txBody>
+      </p:sp>
+      <p:pic>
+        <p:nvPicPr>
+          <p:cNvPr id="1026" name="Picture 2" descr="How would a dog wear pants? The Internet finally has an answer">
+            <a:extLst>
+              <a:ext uri="{FF2B5EF4-FFF2-40B4-BE49-F238E27FC236}">
+                <a16:creationId xmlns:a16="http://schemas.microsoft.com/office/drawing/2014/main" id="{974A7584-8B53-4BBE-8248-53CB7CAECD25}"/>
+              </a:ext>
+            </a:extLst>
+          </p:cNvPr>
+          <p:cNvPicPr>
+            <a:picLocks noGrp="1" noChangeAspect="1" noChangeArrowheads="1"/>
+          </p:cNvPicPr>
+          <p:nvPr>
+            <p:ph idx="1"/>
+          </p:nvPr>
+        </p:nvPicPr>
+        <p:blipFill>
+          <a:blip r:embed="rId2">
+            <a:extLst>
+              <a:ext uri="{28A0092B-C50C-407E-A947-70E740481C1C}">
+                <a14:useLocalDpi xmlns:a14="http://schemas.microsoft.com/office/drawing/2010/main" val="0"/>
+              </a:ext>
+            </a:extLst>
+          </a:blip>
+          <a:srcRect/>
+          <a:stretch>
+            <a:fillRect/>
+          </a:stretch>
+        </p:blipFill>
+        <p:spPr bwMode="auto">
+          <a:xfrm>
+            <a:off x="2230206" y="1825625"/>
+            <a:ext cx="7731588" cy="4351338"/>
+          </a:xfrm>
+          <a:prstGeom prst="rect">
+            <a:avLst/>
+          </a:prstGeom>
+          <a:noFill/>
+          <a:extLst>
+            <a:ext uri="{909E8E84-426E-40DD-AFC4-6F175D3DCCD1}">
+              <a14:hiddenFill xmlns:a14="http://schemas.microsoft.com/office/drawing/2010/main">
+                <a:solidFill>
+                  <a:srgbClr val="FFFFFF"/>
+                </a:solidFill>
+              </a14:hiddenFill>
+            </a:ext>
+          </a:extLst>
+        </p:spPr>
+      </p:pic>
+    </p:spTree>
+    <p:extLst>
+      <p:ext uri="{BB962C8B-B14F-4D97-AF65-F5344CB8AC3E}">
+        <p14:creationId xmlns:p14="http://schemas.microsoft.com/office/powerpoint/2010/main" val="893090282"/>
+      </p:ext>
+    </p:extLst>
+  </p:cSld>
+  <p:clrMapOvr>
+    <a:masterClrMapping/>
+  </p:clrMapOvr>
+</p:sld>
+</file>
+
+<file path=ppt/slides/slide19.xml><?xml version="1.0" encoding="utf-8"?>
+<p:sld xmlns:a="http://schemas.openxmlformats.org/drawingml/2006/main" xmlns:r="http://schemas.openxmlformats.org/officeDocument/2006/relationships" xmlns:p="http://schemas.openxmlformats.org/presentationml/2006/main">
+  <p:cSld>
+    <p:spTree>
+      <p:nvGrpSpPr>
+        <p:cNvPr id="1" name=""/>
+        <p:cNvGrpSpPr/>
+        <p:nvPr/>
+      </p:nvGrpSpPr>
+      <p:grpSpPr>
+        <a:xfrm>
+          <a:off x="0" y="0"/>
+          <a:ext cx="0" cy="0"/>
+          <a:chOff x="0" y="0"/>
+          <a:chExt cx="0" cy="0"/>
+        </a:xfrm>
+      </p:grpSpPr>
+      <p:pic>
+        <p:nvPicPr>
+          <p:cNvPr id="4" name="Content Placeholder 3">
+            <a:extLst>
+              <a:ext uri="{FF2B5EF4-FFF2-40B4-BE49-F238E27FC236}">
+                <a16:creationId xmlns:a16="http://schemas.microsoft.com/office/drawing/2014/main" id="{446FE656-884D-4938-BA7D-92591F347762}"/>
+              </a:ext>
+            </a:extLst>
+          </p:cNvPr>
+          <p:cNvPicPr>
+            <a:picLocks noGrp="1" noChangeAspect="1"/>
+          </p:cNvPicPr>
+          <p:nvPr>
+            <p:ph idx="1"/>
+          </p:nvPr>
+        </p:nvPicPr>
+        <p:blipFill>
+          <a:blip r:embed="rId2"/>
+          <a:stretch>
+            <a:fillRect/>
+          </a:stretch>
+        </p:blipFill>
+        <p:spPr>
+          <a:xfrm>
+            <a:off x="2038864" y="38122"/>
+            <a:ext cx="8114271" cy="6781755"/>
+          </a:xfrm>
+          <a:prstGeom prst="rect">
+            <a:avLst/>
+          </a:prstGeom>
+        </p:spPr>
+      </p:pic>
+      <p:sp>
+        <p:nvSpPr>
+          <p:cNvPr id="7" name="Rectangle: Rounded Corners 6">
+            <a:extLst>
+              <a:ext uri="{FF2B5EF4-FFF2-40B4-BE49-F238E27FC236}">
+                <a16:creationId xmlns:a16="http://schemas.microsoft.com/office/drawing/2014/main" id="{EDBDED34-C23A-43DA-8779-6BC2DE3C3663}"/>
+              </a:ext>
+            </a:extLst>
+          </p:cNvPr>
+          <p:cNvSpPr/>
+          <p:nvPr/>
+        </p:nvSpPr>
+        <p:spPr>
+          <a:xfrm>
+            <a:off x="354227" y="675503"/>
+            <a:ext cx="1293341" cy="1210962"/>
+          </a:xfrm>
+          <a:prstGeom prst="roundRect">
+            <a:avLst/>
+          </a:prstGeom>
+        </p:spPr>
+        <p:style>
+          <a:lnRef idx="2">
+            <a:schemeClr val="accent1">
+              <a:shade val="50000"/>
+            </a:schemeClr>
+          </a:lnRef>
+          <a:fillRef idx="1">
+            <a:schemeClr val="accent1"/>
+          </a:fillRef>
+          <a:effectRef idx="0">
+            <a:schemeClr val="accent1"/>
+          </a:effectRef>
+          <a:fontRef idx="minor">
+            <a:schemeClr val="lt1"/>
+          </a:fontRef>
+        </p:style>
+        <p:txBody>
+          <a:bodyPr rtlCol="0" anchor="ctr"/>
+          <a:lstStyle/>
+          <a:p>
+            <a:pPr algn="ctr"/>
+            <a:r>
+              <a:rPr lang="en-US" dirty="0"/>
+              <a:t>UP</a:t>
+            </a:r>
+          </a:p>
+        </p:txBody>
+      </p:sp>
+      <p:sp>
+        <p:nvSpPr>
+          <p:cNvPr id="8" name="Rectangle: Rounded Corners 7">
+            <a:extLst>
+              <a:ext uri="{FF2B5EF4-FFF2-40B4-BE49-F238E27FC236}">
+                <a16:creationId xmlns:a16="http://schemas.microsoft.com/office/drawing/2014/main" id="{BA1BAD06-60DE-4203-9C2B-FEECFFA4AFE7}"/>
+              </a:ext>
+            </a:extLst>
+          </p:cNvPr>
+          <p:cNvSpPr/>
+          <p:nvPr/>
+        </p:nvSpPr>
+        <p:spPr>
+          <a:xfrm>
+            <a:off x="2463114" y="4555524"/>
+            <a:ext cx="1260389" cy="1153298"/>
+          </a:xfrm>
+          <a:prstGeom prst="roundRect">
+            <a:avLst/>
+          </a:prstGeom>
+        </p:spPr>
+        <p:style>
+          <a:lnRef idx="2">
+            <a:schemeClr val="accent1">
+              <a:shade val="50000"/>
+            </a:schemeClr>
+          </a:lnRef>
+          <a:fillRef idx="1">
+            <a:schemeClr val="accent1"/>
+          </a:fillRef>
+          <a:effectRef idx="0">
+            <a:schemeClr val="accent1"/>
+          </a:effectRef>
+          <a:fontRef idx="minor">
+            <a:schemeClr val="lt1"/>
+          </a:fontRef>
+        </p:style>
+        <p:txBody>
+          <a:bodyPr rtlCol="0" anchor="ctr"/>
+          <a:lstStyle/>
+          <a:p>
+            <a:pPr algn="ctr"/>
+            <a:r>
+              <a:rPr lang="en-US" dirty="0"/>
+              <a:t>Wiggle</a:t>
+            </a:r>
+          </a:p>
+        </p:txBody>
+      </p:sp>
+      <p:sp>
+        <p:nvSpPr>
+          <p:cNvPr id="9" name="Rectangle: Rounded Corners 8">
+            <a:extLst>
+              <a:ext uri="{FF2B5EF4-FFF2-40B4-BE49-F238E27FC236}">
+                <a16:creationId xmlns:a16="http://schemas.microsoft.com/office/drawing/2014/main" id="{A72D22AD-ABD8-4D5B-B5E3-3BF83CEEFD51}"/>
+              </a:ext>
+            </a:extLst>
+          </p:cNvPr>
+          <p:cNvSpPr/>
+          <p:nvPr/>
+        </p:nvSpPr>
+        <p:spPr>
+          <a:xfrm>
+            <a:off x="10305535" y="848497"/>
+            <a:ext cx="1318054" cy="1103871"/>
+          </a:xfrm>
+          <a:prstGeom prst="roundRect">
+            <a:avLst/>
+          </a:prstGeom>
+        </p:spPr>
+        <p:style>
+          <a:lnRef idx="2">
+            <a:schemeClr val="accent1">
+              <a:shade val="50000"/>
+            </a:schemeClr>
+          </a:lnRef>
+          <a:fillRef idx="1">
+            <a:schemeClr val="accent1"/>
+          </a:fillRef>
+          <a:effectRef idx="0">
+            <a:schemeClr val="accent1"/>
+          </a:effectRef>
+          <a:fontRef idx="minor">
+            <a:schemeClr val="lt1"/>
+          </a:fontRef>
+        </p:style>
+        <p:txBody>
+          <a:bodyPr rtlCol="0" anchor="ctr"/>
+          <a:lstStyle/>
+          <a:p>
+            <a:pPr algn="ctr"/>
+            <a:r>
+              <a:rPr lang="en-US" dirty="0"/>
+              <a:t>Down</a:t>
+            </a:r>
+          </a:p>
+        </p:txBody>
+      </p:sp>
+    </p:spTree>
+    <p:extLst>
+      <p:ext uri="{BB962C8B-B14F-4D97-AF65-F5344CB8AC3E}">
+        <p14:creationId xmlns:p14="http://schemas.microsoft.com/office/powerpoint/2010/main" val="3089692019"/>
+      </p:ext>
+    </p:extLst>
+  </p:cSld>
+  <p:clrMapOvr>
+    <a:masterClrMapping/>
+  </p:clrMapOvr>
 </p:sld>
 </file>
 
@@ -6846,6 +6611,738 @@
 </p:sld>
 </file>
 
+<file path=ppt/slides/slide20.xml><?xml version="1.0" encoding="utf-8"?>
+<p:sld xmlns:a="http://schemas.openxmlformats.org/drawingml/2006/main" xmlns:r="http://schemas.openxmlformats.org/officeDocument/2006/relationships" xmlns:p="http://schemas.openxmlformats.org/presentationml/2006/main">
+  <p:cSld>
+    <p:spTree>
+      <p:nvGrpSpPr>
+        <p:cNvPr id="1" name=""/>
+        <p:cNvGrpSpPr/>
+        <p:nvPr/>
+      </p:nvGrpSpPr>
+      <p:grpSpPr>
+        <a:xfrm>
+          <a:off x="0" y="0"/>
+          <a:ext cx="0" cy="0"/>
+          <a:chOff x="0" y="0"/>
+          <a:chExt cx="0" cy="0"/>
+        </a:xfrm>
+      </p:grpSpPr>
+      <p:sp>
+        <p:nvSpPr>
+          <p:cNvPr id="2" name="Title 1">
+            <a:extLst>
+              <a:ext uri="{FF2B5EF4-FFF2-40B4-BE49-F238E27FC236}">
+                <a16:creationId xmlns:a16="http://schemas.microsoft.com/office/drawing/2014/main" id="{62319947-802E-4CB1-8E44-6EEAC37BE047}"/>
+              </a:ext>
+            </a:extLst>
+          </p:cNvPr>
+          <p:cNvSpPr>
+            <a:spLocks noGrp="1"/>
+          </p:cNvSpPr>
+          <p:nvPr>
+            <p:ph type="title"/>
+          </p:nvPr>
+        </p:nvSpPr>
+        <p:spPr/>
+        <p:txBody>
+          <a:bodyPr/>
+          <a:lstStyle/>
+          <a:p>
+            <a:r>
+              <a:rPr lang="en-US" dirty="0"/>
+              <a:t>Getting Started</a:t>
+            </a:r>
+          </a:p>
+        </p:txBody>
+      </p:sp>
+      <p:sp>
+        <p:nvSpPr>
+          <p:cNvPr id="3" name="Content Placeholder 2">
+            <a:extLst>
+              <a:ext uri="{FF2B5EF4-FFF2-40B4-BE49-F238E27FC236}">
+                <a16:creationId xmlns:a16="http://schemas.microsoft.com/office/drawing/2014/main" id="{940F814C-1647-4465-B18F-ECB9025C5855}"/>
+              </a:ext>
+            </a:extLst>
+          </p:cNvPr>
+          <p:cNvSpPr>
+            <a:spLocks noGrp="1"/>
+          </p:cNvSpPr>
+          <p:nvPr>
+            <p:ph idx="1"/>
+          </p:nvPr>
+        </p:nvSpPr>
+        <p:spPr/>
+        <p:txBody>
+          <a:bodyPr/>
+          <a:lstStyle/>
+          <a:p>
+            <a:r>
+              <a:rPr lang="en-US" dirty="0"/>
+              <a:t>Please update your schedule books now</a:t>
+            </a:r>
+          </a:p>
+          <a:p>
+            <a:r>
+              <a:rPr lang="en-US" dirty="0"/>
+              <a:t>Please start your first day Reflection</a:t>
+            </a:r>
+          </a:p>
+          <a:p>
+            <a:endParaRPr lang="en-US" dirty="0"/>
+          </a:p>
+        </p:txBody>
+      </p:sp>
+    </p:spTree>
+    <p:extLst>
+      <p:ext uri="{BB962C8B-B14F-4D97-AF65-F5344CB8AC3E}">
+        <p14:creationId xmlns:p14="http://schemas.microsoft.com/office/powerpoint/2010/main" val="2401728319"/>
+      </p:ext>
+    </p:extLst>
+  </p:cSld>
+  <p:clrMapOvr>
+    <a:masterClrMapping/>
+  </p:clrMapOvr>
+  <p:timing>
+    <p:tnLst>
+      <p:par>
+        <p:cTn id="1" dur="indefinite" restart="never" nodeType="tmRoot">
+          <p:childTnLst>
+            <p:seq concurrent="1" nextAc="seek">
+              <p:cTn id="2" dur="indefinite" nodeType="mainSeq">
+                <p:childTnLst>
+                  <p:par>
+                    <p:cTn id="3" fill="hold">
+                      <p:stCondLst>
+                        <p:cond delay="indefinite"/>
+                      </p:stCondLst>
+                      <p:childTnLst>
+                        <p:par>
+                          <p:cTn id="4" fill="hold">
+                            <p:stCondLst>
+                              <p:cond delay="0"/>
+                            </p:stCondLst>
+                            <p:childTnLst>
+                              <p:par>
+                                <p:cTn id="5" presetID="1" presetClass="entr" presetSubtype="0" fill="hold" grpId="0" nodeType="clickEffect">
+                                  <p:stCondLst>
+                                    <p:cond delay="0"/>
+                                  </p:stCondLst>
+                                  <p:childTnLst>
+                                    <p:set>
+                                      <p:cBhvr>
+                                        <p:cTn id="6" dur="1" fill="hold">
+                                          <p:stCondLst>
+                                            <p:cond delay="0"/>
+                                          </p:stCondLst>
+                                        </p:cTn>
+                                        <p:tgtEl>
+                                          <p:spTgt spid="3">
+                                            <p:txEl>
+                                              <p:pRg st="0" end="0"/>
+                                            </p:txEl>
+                                          </p:spTgt>
+                                        </p:tgtEl>
+                                        <p:attrNameLst>
+                                          <p:attrName>style.visibility</p:attrName>
+                                        </p:attrNameLst>
+                                      </p:cBhvr>
+                                      <p:to>
+                                        <p:strVal val="visible"/>
+                                      </p:to>
+                                    </p:set>
+                                  </p:childTnLst>
+                                </p:cTn>
+                              </p:par>
+                            </p:childTnLst>
+                          </p:cTn>
+                        </p:par>
+                      </p:childTnLst>
+                    </p:cTn>
+                  </p:par>
+                  <p:par>
+                    <p:cTn id="7" fill="hold">
+                      <p:stCondLst>
+                        <p:cond delay="indefinite"/>
+                      </p:stCondLst>
+                      <p:childTnLst>
+                        <p:par>
+                          <p:cTn id="8" fill="hold">
+                            <p:stCondLst>
+                              <p:cond delay="0"/>
+                            </p:stCondLst>
+                            <p:childTnLst>
+                              <p:par>
+                                <p:cTn id="9" presetID="1" presetClass="entr" presetSubtype="0" fill="hold" grpId="0" nodeType="clickEffect">
+                                  <p:stCondLst>
+                                    <p:cond delay="0"/>
+                                  </p:stCondLst>
+                                  <p:childTnLst>
+                                    <p:set>
+                                      <p:cBhvr>
+                                        <p:cTn id="10" dur="1" fill="hold">
+                                          <p:stCondLst>
+                                            <p:cond delay="0"/>
+                                          </p:stCondLst>
+                                        </p:cTn>
+                                        <p:tgtEl>
+                                          <p:spTgt spid="3">
+                                            <p:txEl>
+                                              <p:pRg st="1" end="1"/>
+                                            </p:txEl>
+                                          </p:spTgt>
+                                        </p:tgtEl>
+                                        <p:attrNameLst>
+                                          <p:attrName>style.visibility</p:attrName>
+                                        </p:attrNameLst>
+                                      </p:cBhvr>
+                                      <p:to>
+                                        <p:strVal val="visible"/>
+                                      </p:to>
+                                    </p:set>
+                                  </p:childTnLst>
+                                </p:cTn>
+                              </p:par>
+                            </p:childTnLst>
+                          </p:cTn>
+                        </p:par>
+                      </p:childTnLst>
+                    </p:cTn>
+                  </p:par>
+                </p:childTnLst>
+              </p:cTn>
+              <p:prevCondLst>
+                <p:cond evt="onPrev" delay="0">
+                  <p:tgtEl>
+                    <p:sldTgt/>
+                  </p:tgtEl>
+                </p:cond>
+              </p:prevCondLst>
+              <p:nextCondLst>
+                <p:cond evt="onNext" delay="0">
+                  <p:tgtEl>
+                    <p:sldTgt/>
+                  </p:tgtEl>
+                </p:cond>
+              </p:nextCondLst>
+            </p:seq>
+          </p:childTnLst>
+        </p:cTn>
+      </p:par>
+    </p:tnLst>
+    <p:bldLst>
+      <p:bldP spid="3" grpId="0" build="p"/>
+    </p:bldLst>
+  </p:timing>
+</p:sld>
+</file>
+
+<file path=ppt/slides/slide21.xml><?xml version="1.0" encoding="utf-8"?>
+<p:sld xmlns:a="http://schemas.openxmlformats.org/drawingml/2006/main" xmlns:r="http://schemas.openxmlformats.org/officeDocument/2006/relationships" xmlns:p="http://schemas.openxmlformats.org/presentationml/2006/main">
+  <p:cSld>
+    <p:bg>
+      <p:bgPr>
+        <a:solidFill>
+          <a:schemeClr val="bg1">
+            <a:tint val="95000"/>
+            <a:satMod val="170000"/>
+          </a:schemeClr>
+        </a:solidFill>
+        <a:effectLst/>
+      </p:bgPr>
+    </p:bg>
+    <p:spTree>
+      <p:nvGrpSpPr>
+        <p:cNvPr id="1" name=""/>
+        <p:cNvGrpSpPr/>
+        <p:nvPr/>
+      </p:nvGrpSpPr>
+      <p:grpSpPr>
+        <a:xfrm>
+          <a:off x="0" y="0"/>
+          <a:ext cx="0" cy="0"/>
+          <a:chOff x="0" y="0"/>
+          <a:chExt cx="0" cy="0"/>
+        </a:xfrm>
+      </p:grpSpPr>
+      <p:sp>
+        <p:nvSpPr>
+          <p:cNvPr id="9" name="Freeform: Shape 8">
+            <a:extLst>
+              <a:ext uri="{FF2B5EF4-FFF2-40B4-BE49-F238E27FC236}">
+                <a16:creationId xmlns:a16="http://schemas.microsoft.com/office/drawing/2014/main" id="{66B332A4-D438-4773-A77F-5ED49A448D9D}"/>
+              </a:ext>
+              <a:ext uri="{C183D7F6-B498-43B3-948B-1728B52AA6E4}">
+                <adec:decorative xmlns:adec="http://schemas.microsoft.com/office/drawing/2017/decorative" val="1"/>
+              </a:ext>
+            </a:extLst>
+          </p:cNvPr>
+          <p:cNvSpPr>
+            <a:spLocks noGrp="1" noRot="1" noChangeAspect="1" noMove="1" noResize="1" noEditPoints="1" noAdjustHandles="1" noChangeArrowheads="1" noChangeShapeType="1" noTextEdit="1"/>
+          </p:cNvSpPr>
+          <p:nvPr>
+            <p:extLst>
+              <p:ext uri="{386F3935-93C4-4BCD-93E2-E3B085C9AB24}">
+                <p16:designElem xmlns:p16="http://schemas.microsoft.com/office/powerpoint/2015/main" val="1"/>
+              </p:ext>
+            </p:extLst>
+          </p:nvPr>
+        </p:nvSpPr>
+        <p:spPr>
+          <a:xfrm>
+            <a:off x="1953768" y="0"/>
+            <a:ext cx="8284464" cy="6858000"/>
+          </a:xfrm>
+          <a:custGeom>
+            <a:avLst/>
+            <a:gdLst>
+              <a:gd name="connsiteX0" fmla="*/ 1818109 w 8284464"/>
+              <a:gd name="connsiteY0" fmla="*/ 0 h 6858000"/>
+              <a:gd name="connsiteX1" fmla="*/ 6466355 w 8284464"/>
+              <a:gd name="connsiteY1" fmla="*/ 0 h 6858000"/>
+              <a:gd name="connsiteX2" fmla="*/ 6620596 w 8284464"/>
+              <a:gd name="connsiteY2" fmla="*/ 109683 h 6858000"/>
+              <a:gd name="connsiteX3" fmla="*/ 8284464 w 8284464"/>
+              <a:gd name="connsiteY3" fmla="*/ 3429000 h 6858000"/>
+              <a:gd name="connsiteX4" fmla="*/ 6620596 w 8284464"/>
+              <a:gd name="connsiteY4" fmla="*/ 6748318 h 6858000"/>
+              <a:gd name="connsiteX5" fmla="*/ 6466355 w 8284464"/>
+              <a:gd name="connsiteY5" fmla="*/ 6858000 h 6858000"/>
+              <a:gd name="connsiteX6" fmla="*/ 1818109 w 8284464"/>
+              <a:gd name="connsiteY6" fmla="*/ 6858000 h 6858000"/>
+              <a:gd name="connsiteX7" fmla="*/ 1663869 w 8284464"/>
+              <a:gd name="connsiteY7" fmla="*/ 6748318 h 6858000"/>
+              <a:gd name="connsiteX8" fmla="*/ 0 w 8284464"/>
+              <a:gd name="connsiteY8" fmla="*/ 3429000 h 6858000"/>
+              <a:gd name="connsiteX9" fmla="*/ 1663869 w 8284464"/>
+              <a:gd name="connsiteY9" fmla="*/ 109683 h 6858000"/>
+            </a:gdLst>
+            <a:ahLst/>
+            <a:cxnLst>
+              <a:cxn ang="0">
+                <a:pos x="connsiteX0" y="connsiteY0"/>
+              </a:cxn>
+              <a:cxn ang="0">
+                <a:pos x="connsiteX1" y="connsiteY1"/>
+              </a:cxn>
+              <a:cxn ang="0">
+                <a:pos x="connsiteX2" y="connsiteY2"/>
+              </a:cxn>
+              <a:cxn ang="0">
+                <a:pos x="connsiteX3" y="connsiteY3"/>
+              </a:cxn>
+              <a:cxn ang="0">
+                <a:pos x="connsiteX4" y="connsiteY4"/>
+              </a:cxn>
+              <a:cxn ang="0">
+                <a:pos x="connsiteX5" y="connsiteY5"/>
+              </a:cxn>
+              <a:cxn ang="0">
+                <a:pos x="connsiteX6" y="connsiteY6"/>
+              </a:cxn>
+              <a:cxn ang="0">
+                <a:pos x="connsiteX7" y="connsiteY7"/>
+              </a:cxn>
+              <a:cxn ang="0">
+                <a:pos x="connsiteX8" y="connsiteY8"/>
+              </a:cxn>
+              <a:cxn ang="0">
+                <a:pos x="connsiteX9" y="connsiteY9"/>
+              </a:cxn>
+            </a:cxnLst>
+            <a:rect l="l" t="t" r="r" b="b"/>
+            <a:pathLst>
+              <a:path w="8284464" h="6858000">
+                <a:moveTo>
+                  <a:pt x="1818109" y="0"/>
+                </a:moveTo>
+                <a:lnTo>
+                  <a:pt x="6466355" y="0"/>
+                </a:lnTo>
+                <a:lnTo>
+                  <a:pt x="6620596" y="109683"/>
+                </a:lnTo>
+                <a:cubicBezTo>
+                  <a:pt x="7630666" y="865069"/>
+                  <a:pt x="8284464" y="2070683"/>
+                  <a:pt x="8284464" y="3429000"/>
+                </a:cubicBezTo>
+                <a:cubicBezTo>
+                  <a:pt x="8284464" y="4787317"/>
+                  <a:pt x="7630666" y="5992931"/>
+                  <a:pt x="6620596" y="6748318"/>
+                </a:cubicBezTo>
+                <a:lnTo>
+                  <a:pt x="6466355" y="6858000"/>
+                </a:lnTo>
+                <a:lnTo>
+                  <a:pt x="1818109" y="6858000"/>
+                </a:lnTo>
+                <a:lnTo>
+                  <a:pt x="1663869" y="6748318"/>
+                </a:lnTo>
+                <a:cubicBezTo>
+                  <a:pt x="653798" y="5992931"/>
+                  <a:pt x="0" y="4787317"/>
+                  <a:pt x="0" y="3429000"/>
+                </a:cubicBezTo>
+                <a:cubicBezTo>
+                  <a:pt x="0" y="2070683"/>
+                  <a:pt x="653798" y="865069"/>
+                  <a:pt x="1663869" y="109683"/>
+                </a:cubicBezTo>
+                <a:close/>
+              </a:path>
+            </a:pathLst>
+          </a:custGeom>
+          <a:solidFill>
+            <a:srgbClr val="FFFFFF">
+              <a:alpha val="80000"/>
+            </a:srgbClr>
+          </a:solidFill>
+          <a:ln>
+            <a:noFill/>
+          </a:ln>
+        </p:spPr>
+        <p:style>
+          <a:lnRef idx="2">
+            <a:schemeClr val="accent1">
+              <a:shade val="50000"/>
+            </a:schemeClr>
+          </a:lnRef>
+          <a:fillRef idx="1">
+            <a:schemeClr val="accent1"/>
+          </a:fillRef>
+          <a:effectRef idx="0">
+            <a:schemeClr val="accent1"/>
+          </a:effectRef>
+          <a:fontRef idx="minor">
+            <a:schemeClr val="lt1"/>
+          </a:fontRef>
+        </p:style>
+        <p:txBody>
+          <a:bodyPr wrap="square" rtlCol="0" anchor="ctr">
+            <a:noAutofit/>
+          </a:bodyPr>
+          <a:lstStyle/>
+          <a:p>
+            <a:pPr algn="ctr"/>
+            <a:endParaRPr lang="en-US"/>
+          </a:p>
+        </p:txBody>
+      </p:sp>
+      <p:sp>
+        <p:nvSpPr>
+          <p:cNvPr id="11" name="Freeform: Shape 10">
+            <a:extLst>
+              <a:ext uri="{FF2B5EF4-FFF2-40B4-BE49-F238E27FC236}">
+                <a16:creationId xmlns:a16="http://schemas.microsoft.com/office/drawing/2014/main" id="{DF9AD32D-FF05-44F4-BD4D-9CEE89B71EB9}"/>
+              </a:ext>
+              <a:ext uri="{C183D7F6-B498-43B3-948B-1728B52AA6E4}">
+                <adec:decorative xmlns:adec="http://schemas.microsoft.com/office/drawing/2017/decorative" val="1"/>
+              </a:ext>
+            </a:extLst>
+          </p:cNvPr>
+          <p:cNvSpPr>
+            <a:spLocks noGrp="1" noRot="1" noChangeAspect="1" noMove="1" noResize="1" noEditPoints="1" noAdjustHandles="1" noChangeArrowheads="1" noChangeShapeType="1" noTextEdit="1"/>
+          </p:cNvSpPr>
+          <p:nvPr>
+            <p:extLst>
+              <p:ext uri="{386F3935-93C4-4BCD-93E2-E3B085C9AB24}">
+                <p16:designElem xmlns:p16="http://schemas.microsoft.com/office/powerpoint/2015/main" val="1"/>
+              </p:ext>
+            </p:extLst>
+          </p:nvPr>
+        </p:nvSpPr>
+        <p:spPr>
+          <a:xfrm>
+            <a:off x="2118360" y="0"/>
+            <a:ext cx="7955280" cy="6858000"/>
+          </a:xfrm>
+          <a:custGeom>
+            <a:avLst/>
+            <a:gdLst>
+              <a:gd name="connsiteX0" fmla="*/ 1962423 w 7955280"/>
+              <a:gd name="connsiteY0" fmla="*/ 0 h 6858000"/>
+              <a:gd name="connsiteX1" fmla="*/ 5992858 w 7955280"/>
+              <a:gd name="connsiteY1" fmla="*/ 0 h 6858000"/>
+              <a:gd name="connsiteX2" fmla="*/ 6040191 w 7955280"/>
+              <a:gd name="connsiteY2" fmla="*/ 27216 h 6858000"/>
+              <a:gd name="connsiteX3" fmla="*/ 7955280 w 7955280"/>
+              <a:gd name="connsiteY3" fmla="*/ 3429000 h 6858000"/>
+              <a:gd name="connsiteX4" fmla="*/ 6040191 w 7955280"/>
+              <a:gd name="connsiteY4" fmla="*/ 6830784 h 6858000"/>
+              <a:gd name="connsiteX5" fmla="*/ 5992858 w 7955280"/>
+              <a:gd name="connsiteY5" fmla="*/ 6858000 h 6858000"/>
+              <a:gd name="connsiteX6" fmla="*/ 1962423 w 7955280"/>
+              <a:gd name="connsiteY6" fmla="*/ 6858000 h 6858000"/>
+              <a:gd name="connsiteX7" fmla="*/ 1915089 w 7955280"/>
+              <a:gd name="connsiteY7" fmla="*/ 6830784 h 6858000"/>
+              <a:gd name="connsiteX8" fmla="*/ 0 w 7955280"/>
+              <a:gd name="connsiteY8" fmla="*/ 3429000 h 6858000"/>
+              <a:gd name="connsiteX9" fmla="*/ 1915089 w 7955280"/>
+              <a:gd name="connsiteY9" fmla="*/ 27216 h 6858000"/>
+            </a:gdLst>
+            <a:ahLst/>
+            <a:cxnLst>
+              <a:cxn ang="0">
+                <a:pos x="connsiteX0" y="connsiteY0"/>
+              </a:cxn>
+              <a:cxn ang="0">
+                <a:pos x="connsiteX1" y="connsiteY1"/>
+              </a:cxn>
+              <a:cxn ang="0">
+                <a:pos x="connsiteX2" y="connsiteY2"/>
+              </a:cxn>
+              <a:cxn ang="0">
+                <a:pos x="connsiteX3" y="connsiteY3"/>
+              </a:cxn>
+              <a:cxn ang="0">
+                <a:pos x="connsiteX4" y="connsiteY4"/>
+              </a:cxn>
+              <a:cxn ang="0">
+                <a:pos x="connsiteX5" y="connsiteY5"/>
+              </a:cxn>
+              <a:cxn ang="0">
+                <a:pos x="connsiteX6" y="connsiteY6"/>
+              </a:cxn>
+              <a:cxn ang="0">
+                <a:pos x="connsiteX7" y="connsiteY7"/>
+              </a:cxn>
+              <a:cxn ang="0">
+                <a:pos x="connsiteX8" y="connsiteY8"/>
+              </a:cxn>
+              <a:cxn ang="0">
+                <a:pos x="connsiteX9" y="connsiteY9"/>
+              </a:cxn>
+            </a:cxnLst>
+            <a:rect l="l" t="t" r="r" b="b"/>
+            <a:pathLst>
+              <a:path w="7955280" h="6858000">
+                <a:moveTo>
+                  <a:pt x="1962423" y="0"/>
+                </a:moveTo>
+                <a:lnTo>
+                  <a:pt x="5992858" y="0"/>
+                </a:lnTo>
+                <a:lnTo>
+                  <a:pt x="6040191" y="27216"/>
+                </a:lnTo>
+                <a:cubicBezTo>
+                  <a:pt x="7188332" y="724844"/>
+                  <a:pt x="7955280" y="1987357"/>
+                  <a:pt x="7955280" y="3429000"/>
+                </a:cubicBezTo>
+                <a:cubicBezTo>
+                  <a:pt x="7955280" y="4870644"/>
+                  <a:pt x="7188332" y="6133157"/>
+                  <a:pt x="6040191" y="6830784"/>
+                </a:cubicBezTo>
+                <a:lnTo>
+                  <a:pt x="5992858" y="6858000"/>
+                </a:lnTo>
+                <a:lnTo>
+                  <a:pt x="1962423" y="6858000"/>
+                </a:lnTo>
+                <a:lnTo>
+                  <a:pt x="1915089" y="6830784"/>
+                </a:lnTo>
+                <a:cubicBezTo>
+                  <a:pt x="766948" y="6133157"/>
+                  <a:pt x="0" y="4870644"/>
+                  <a:pt x="0" y="3429000"/>
+                </a:cubicBezTo>
+                <a:cubicBezTo>
+                  <a:pt x="0" y="1987357"/>
+                  <a:pt x="766948" y="724844"/>
+                  <a:pt x="1915089" y="27216"/>
+                </a:cubicBezTo>
+                <a:close/>
+              </a:path>
+            </a:pathLst>
+          </a:custGeom>
+          <a:solidFill>
+            <a:schemeClr val="tx1"/>
+          </a:solidFill>
+          <a:ln>
+            <a:noFill/>
+          </a:ln>
+        </p:spPr>
+        <p:style>
+          <a:lnRef idx="2">
+            <a:schemeClr val="accent1">
+              <a:shade val="50000"/>
+            </a:schemeClr>
+          </a:lnRef>
+          <a:fillRef idx="1">
+            <a:schemeClr val="accent1"/>
+          </a:fillRef>
+          <a:effectRef idx="0">
+            <a:schemeClr val="accent1"/>
+          </a:effectRef>
+          <a:fontRef idx="minor">
+            <a:schemeClr val="lt1"/>
+          </a:fontRef>
+        </p:style>
+        <p:txBody>
+          <a:bodyPr wrap="square" rtlCol="0" anchor="ctr">
+            <a:noAutofit/>
+          </a:bodyPr>
+          <a:lstStyle/>
+          <a:p>
+            <a:pPr algn="ctr"/>
+            <a:endParaRPr lang="en-US"/>
+          </a:p>
+        </p:txBody>
+      </p:sp>
+      <p:sp>
+        <p:nvSpPr>
+          <p:cNvPr id="4" name="Title 3">
+            <a:extLst>
+              <a:ext uri="{FF2B5EF4-FFF2-40B4-BE49-F238E27FC236}">
+                <a16:creationId xmlns:a16="http://schemas.microsoft.com/office/drawing/2014/main" id="{485F5261-2466-422E-8729-DD95ECBB1F09}"/>
+              </a:ext>
+            </a:extLst>
+          </p:cNvPr>
+          <p:cNvSpPr>
+            <a:spLocks noGrp="1"/>
+          </p:cNvSpPr>
+          <p:nvPr>
+            <p:ph type="title"/>
+          </p:nvPr>
+        </p:nvSpPr>
+        <p:spPr>
+          <a:xfrm>
+            <a:off x="2555631" y="1441938"/>
+            <a:ext cx="7080738" cy="3974124"/>
+          </a:xfrm>
+        </p:spPr>
+        <p:txBody>
+          <a:bodyPr>
+            <a:normAutofit/>
+          </a:bodyPr>
+          <a:lstStyle/>
+          <a:p>
+            <a:pPr algn="ctr"/>
+            <a:r>
+              <a:rPr lang="en-US" sz="5400" dirty="0">
+                <a:solidFill>
+                  <a:schemeClr val="bg1">
+                    <a:lumMod val="95000"/>
+                    <a:lumOff val="5000"/>
+                  </a:schemeClr>
+                </a:solidFill>
+              </a:rPr>
+              <a:t>The End</a:t>
+            </a:r>
+          </a:p>
+        </p:txBody>
+      </p:sp>
+    </p:spTree>
+    <p:extLst>
+      <p:ext uri="{BB962C8B-B14F-4D97-AF65-F5344CB8AC3E}">
+        <p14:creationId xmlns:p14="http://schemas.microsoft.com/office/powerpoint/2010/main" val="1479035090"/>
+      </p:ext>
+    </p:extLst>
+  </p:cSld>
+  <p:clrMapOvr>
+    <a:overrideClrMapping bg1="dk1" tx1="lt1" bg2="dk2" tx2="lt2" accent1="accent1" accent2="accent2" accent3="accent3" accent4="accent4" accent5="accent5" accent6="accent6" hlink="hlink" folHlink="folHlink"/>
+  </p:clrMapOvr>
+  <p:timing>
+    <p:tnLst>
+      <p:par>
+        <p:cTn id="1" dur="indefinite" restart="never" nodeType="tmRoot">
+          <p:childTnLst>
+            <p:seq concurrent="1" nextAc="seek">
+              <p:cTn id="2" dur="indefinite" nodeType="mainSeq">
+                <p:childTnLst>
+                  <p:par>
+                    <p:cTn id="3" fill="hold">
+                      <p:stCondLst>
+                        <p:cond delay="indefinite"/>
+                        <p:cond evt="onBegin" delay="0">
+                          <p:tn val="2"/>
+                        </p:cond>
+                      </p:stCondLst>
+                      <p:childTnLst>
+                        <p:par>
+                          <p:cTn id="4" fill="hold">
+                            <p:stCondLst>
+                              <p:cond delay="0"/>
+                            </p:stCondLst>
+                            <p:childTnLst>
+                              <p:par>
+                                <p:cTn id="5" presetID="10" presetClass="entr" presetSubtype="0" fill="hold" grpId="0" nodeType="withEffect">
+                                  <p:stCondLst>
+                                    <p:cond delay="500"/>
+                                  </p:stCondLst>
+                                  <p:iterate>
+                                    <p:tmPct val="10000"/>
+                                  </p:iterate>
+                                  <p:childTnLst>
+                                    <p:set>
+                                      <p:cBhvr>
+                                        <p:cTn id="6" dur="1" fill="hold">
+                                          <p:stCondLst>
+                                            <p:cond delay="0"/>
+                                          </p:stCondLst>
+                                        </p:cTn>
+                                        <p:tgtEl>
+                                          <p:spTgt spid="4"/>
+                                        </p:tgtEl>
+                                        <p:attrNameLst>
+                                          <p:attrName>style.visibility</p:attrName>
+                                        </p:attrNameLst>
+                                      </p:cBhvr>
+                                      <p:to>
+                                        <p:strVal val="visible"/>
+                                      </p:to>
+                                    </p:set>
+                                    <p:animEffect transition="in" filter="fade">
+                                      <p:cBhvr>
+                                        <p:cTn id="7" dur="700"/>
+                                        <p:tgtEl>
+                                          <p:spTgt spid="4"/>
+                                        </p:tgtEl>
+                                      </p:cBhvr>
+                                    </p:animEffect>
+                                  </p:childTnLst>
+                                </p:cTn>
+                              </p:par>
+                            </p:childTnLst>
+                          </p:cTn>
+                        </p:par>
+                      </p:childTnLst>
+                    </p:cTn>
+                  </p:par>
+                </p:childTnLst>
+              </p:cTn>
+              <p:prevCondLst>
+                <p:cond evt="onPrev" delay="0">
+                  <p:tgtEl>
+                    <p:sldTgt/>
+                  </p:tgtEl>
+                </p:cond>
+              </p:prevCondLst>
+              <p:nextCondLst>
+                <p:cond evt="onNext" delay="0">
+                  <p:tgtEl>
+                    <p:sldTgt/>
+                  </p:tgtEl>
+                </p:cond>
+              </p:nextCondLst>
+            </p:seq>
+          </p:childTnLst>
+        </p:cTn>
+      </p:par>
+    </p:tnLst>
+    <p:bldLst>
+      <p:bldP spid="4" grpId="0"/>
+    </p:bldLst>
+  </p:timing>
+</p:sld>
+</file>
+
 <file path=ppt/slides/slide3.xml><?xml version="1.0" encoding="utf-8"?>
 <p:sld xmlns:a="http://schemas.openxmlformats.org/drawingml/2006/main" xmlns:r="http://schemas.openxmlformats.org/officeDocument/2006/relationships" xmlns:p="http://schemas.openxmlformats.org/presentationml/2006/main">
   <p:cSld>
@@ -7604,15 +8101,6 @@
 </file>
 
 <file path=customXml/item1.xml><?xml version="1.0" encoding="utf-8"?>
-<?mso-contentType ?>
-<FormTemplates xmlns="http://schemas.microsoft.com/sharepoint/v3/contenttype/forms">
-  <Display>DocumentLibraryForm</Display>
-  <Edit>DocumentLibraryForm</Edit>
-  <New>DocumentLibraryForm</New>
-</FormTemplates>
-</file>
-
-<file path=customXml/item2.xml><?xml version="1.0" encoding="utf-8"?>
 <ct:contentTypeSchema xmlns:ct="http://schemas.microsoft.com/office/2006/metadata/contentType" xmlns:ma="http://schemas.microsoft.com/office/2006/metadata/properties/metaAttributes" ct:_="" ma:_="" ma:contentTypeName="Document" ma:contentTypeID="0x010100ABA223F759147049B9D8A25DED07DD24" ma:contentTypeVersion="14" ma:contentTypeDescription="Create a new document." ma:contentTypeScope="" ma:versionID="754cccfe17833f4d06e0267dc9c12ab7">
   <xsd:schema xmlns:xsd="http://www.w3.org/2001/XMLSchema" xmlns:xs="http://www.w3.org/2001/XMLSchema" xmlns:p="http://schemas.microsoft.com/office/2006/metadata/properties" xmlns:ns3="cc9255bc-4d99-4f42-bba5-857cbcc6e725" xmlns:ns4="fc2bff61-6a31-4c51-9f32-b9bba46405e5" targetNamespace="http://schemas.microsoft.com/office/2006/metadata/properties" ma:root="true" ma:fieldsID="e32414dc8724dfdc561355c14801bc84" ns3:_="" ns4:_="">
     <xsd:import namespace="cc9255bc-4d99-4f42-bba5-857cbcc6e725"/>
@@ -7841,6 +8329,15 @@
 </ct:contentTypeSchema>
 </file>
 
+<file path=customXml/item2.xml><?xml version="1.0" encoding="utf-8"?>
+<?mso-contentType ?>
+<FormTemplates xmlns="http://schemas.microsoft.com/sharepoint/v3/contenttype/forms">
+  <Display>DocumentLibraryForm</Display>
+  <Edit>DocumentLibraryForm</Edit>
+  <New>DocumentLibraryForm</New>
+</FormTemplates>
+</file>
+
 <file path=customXml/item3.xml><?xml version="1.0" encoding="utf-8"?>
 <p:properties xmlns:p="http://schemas.microsoft.com/office/2006/metadata/properties" xmlns:xsi="http://www.w3.org/2001/XMLSchema-instance" xmlns:pc="http://schemas.microsoft.com/office/infopath/2007/PartnerControls">
   <documentManagement/>
@@ -7848,14 +8345,6 @@
 </file>
 
 <file path=customXml/itemProps1.xml><?xml version="1.0" encoding="utf-8"?>
-<ds:datastoreItem xmlns:ds="http://schemas.openxmlformats.org/officeDocument/2006/customXml" ds:itemID="{FFF71063-750A-4F15-A0E6-049A2BA10D5D}">
-  <ds:schemaRefs>
-    <ds:schemaRef ds:uri="http://schemas.microsoft.com/sharepoint/v3/contenttype/forms"/>
-  </ds:schemaRefs>
-</ds:datastoreItem>
-</file>
-
-<file path=customXml/itemProps2.xml><?xml version="1.0" encoding="utf-8"?>
 <ds:datastoreItem xmlns:ds="http://schemas.openxmlformats.org/officeDocument/2006/customXml" ds:itemID="{B2D82F21-8668-4A3F-A308-37FA558F9F37}">
   <ds:schemaRefs>
     <ds:schemaRef ds:uri="http://schemas.microsoft.com/office/2006/metadata/contentType"/>
@@ -7874,19 +8363,27 @@
 </ds:datastoreItem>
 </file>
 
+<file path=customXml/itemProps2.xml><?xml version="1.0" encoding="utf-8"?>
+<ds:datastoreItem xmlns:ds="http://schemas.openxmlformats.org/officeDocument/2006/customXml" ds:itemID="{FFF71063-750A-4F15-A0E6-049A2BA10D5D}">
+  <ds:schemaRefs>
+    <ds:schemaRef ds:uri="http://schemas.microsoft.com/sharepoint/v3/contenttype/forms"/>
+  </ds:schemaRefs>
+</ds:datastoreItem>
+</file>
+
 <file path=customXml/itemProps3.xml><?xml version="1.0" encoding="utf-8"?>
 <ds:datastoreItem xmlns:ds="http://schemas.openxmlformats.org/officeDocument/2006/customXml" ds:itemID="{82A546FB-9270-4554-87AE-89FE30D805B0}">
   <ds:schemaRefs>
-    <ds:schemaRef ds:uri="http://purl.org/dc/dcmitype/"/>
+    <ds:schemaRef ds:uri="http://purl.org/dc/terms/"/>
+    <ds:schemaRef ds:uri="cc9255bc-4d99-4f42-bba5-857cbcc6e725"/>
+    <ds:schemaRef ds:uri="http://schemas.microsoft.com/office/2006/metadata/properties"/>
     <ds:schemaRef ds:uri="http://www.w3.org/XML/1998/namespace"/>
-    <ds:schemaRef ds:uri="fc2bff61-6a31-4c51-9f32-b9bba46405e5"/>
+    <ds:schemaRef ds:uri="http://purl.org/dc/elements/1.1/"/>
     <ds:schemaRef ds:uri="http://schemas.microsoft.com/office/infopath/2007/PartnerControls"/>
     <ds:schemaRef ds:uri="http://schemas.microsoft.com/office/2006/documentManagement/types"/>
-    <ds:schemaRef ds:uri="http://purl.org/dc/terms/"/>
-    <ds:schemaRef ds:uri="http://purl.org/dc/elements/1.1/"/>
     <ds:schemaRef ds:uri="http://schemas.openxmlformats.org/package/2006/metadata/core-properties"/>
-    <ds:schemaRef ds:uri="cc9255bc-4d99-4f42-bba5-857cbcc6e725"/>
-    <ds:schemaRef ds:uri="http://schemas.microsoft.com/office/2006/metadata/properties"/>
+    <ds:schemaRef ds:uri="fc2bff61-6a31-4c51-9f32-b9bba46405e5"/>
+    <ds:schemaRef ds:uri="http://purl.org/dc/dcmitype/"/>
   </ds:schemaRefs>
 </ds:datastoreItem>
 </file>
</xml_diff>